<commit_message>
added options for friction on LSSP and HSSO
</commit_message>
<xml_diff>
--- a/OpenPBS/Resources/illustrations/DescriptionsPerPBS_ToTool.pptx
+++ b/OpenPBS/Resources/illustrations/DescriptionsPerPBS_ToTool.pptx
@@ -5,16 +5,17 @@
     <p:sldMasterId id="2147483648" r:id="rId1"/>
   </p:sldMasterIdLst>
   <p:notesMasterIdLst>
-    <p:notesMasterId r:id="rId9"/>
+    <p:notesMasterId r:id="rId10"/>
   </p:notesMasterIdLst>
   <p:sldIdLst>
     <p:sldId id="258" r:id="rId2"/>
     <p:sldId id="256" r:id="rId3"/>
-    <p:sldId id="261" r:id="rId4"/>
-    <p:sldId id="259" r:id="rId5"/>
-    <p:sldId id="260" r:id="rId6"/>
-    <p:sldId id="257" r:id="rId7"/>
-    <p:sldId id="262" r:id="rId8"/>
+    <p:sldId id="263" r:id="rId4"/>
+    <p:sldId id="261" r:id="rId5"/>
+    <p:sldId id="259" r:id="rId6"/>
+    <p:sldId id="260" r:id="rId7"/>
+    <p:sldId id="257" r:id="rId8"/>
+    <p:sldId id="262" r:id="rId9"/>
   </p:sldIdLst>
   <p:sldSz cx="12192000" cy="6858000"/>
   <p:notesSz cx="6858000" cy="9144000"/>
@@ -203,7 +204,7 @@
           <a:p>
             <a:fld id="{C4323B45-13B1-45B0-9F8E-94CB6922880E}" type="datetimeFigureOut">
               <a:rPr lang="en-GB" smtClean="0"/>
-              <a:t>24/11/2016</a:t>
+              <a:t>01/12/2016</a:t>
             </a:fld>
             <a:endParaRPr lang="en-GB"/>
           </a:p>
@@ -1067,7 +1068,7 @@
             </p:nvGraphicFramePr>
             <p:xfrm>
               <a:off x="3251202" y="1797962"/>
-              <a:ext cx="4314371" cy="4667178"/>
+              <a:ext cx="4314371" cy="4781099"/>
             </p:xfrm>
             <a:graphic>
               <a:graphicData uri="http://schemas.openxmlformats.org/drawingml/2006/table">
@@ -2090,7 +2091,7 @@
                             </a:spcAft>
                           </a:pPr>
                           <a:r>
-                            <a:rPr lang="en-US" sz="1600">
+                            <a:rPr lang="en-US" sz="1600" dirty="0">
                               <a:effectLst/>
                               <a:latin typeface="Cambria" panose="02040503050406030204" pitchFamily="18" charset="0"/>
                               <a:ea typeface="Calibri" panose="020F0502020204030204" pitchFamily="34" charset="0"/>
@@ -2098,7 +2099,7 @@
                             </a:rPr>
                             <a:t>High Speed Steady State Off Tracking</a:t>
                           </a:r>
-                          <a:endParaRPr lang="sv-SE" sz="1800">
+                          <a:endParaRPr lang="sv-SE" sz="1800" dirty="0">
                             <a:effectLst/>
                             <a:latin typeface="Cambria" panose="02040503050406030204" pitchFamily="18" charset="0"/>
                             <a:ea typeface="Calibri" panose="020F0502020204030204" pitchFamily="34" charset="0"/>
@@ -2159,7 +2160,7 @@
                             </a:spcAft>
                           </a:pPr>
                           <a:r>
-                            <a:rPr lang="en-US" sz="1600">
+                            <a:rPr lang="en-US" sz="1600" dirty="0">
                               <a:effectLst/>
                               <a:latin typeface="Cambria" panose="02040503050406030204" pitchFamily="18" charset="0"/>
                               <a:ea typeface="Calibri" panose="020F0502020204030204" pitchFamily="34" charset="0"/>
@@ -2167,7 +2168,7 @@
                             </a:rPr>
                             <a:t>HSSO</a:t>
                           </a:r>
-                          <a:endParaRPr lang="sv-SE" sz="1800">
+                          <a:endParaRPr lang="sv-SE" sz="1800" dirty="0">
                             <a:effectLst/>
                             <a:latin typeface="Cambria" panose="02040503050406030204" pitchFamily="18" charset="0"/>
                             <a:ea typeface="Calibri" panose="020F0502020204030204" pitchFamily="34" charset="0"/>
@@ -5611,15 +5612,7 @@
           <a:p>
             <a:r>
               <a:rPr lang="en-GB" dirty="0"/>
-              <a:t>Generate a bitmap file for each of slide 3 to last slide. Link each such bitmap to Info layer in </a:t>
-            </a:r>
-            <a:r>
-              <a:rPr lang="en-GB" dirty="0"/>
-              <a:t>Modelica model </a:t>
-            </a:r>
-            <a:r>
-              <a:rPr lang="en-GB" dirty="0"/>
-              <a:t>for each PBS.</a:t>
+              <a:t>Generate a bitmap file for each of slide 3 to last slide. Link each such bitmap to Info layer in Modelica model for each PBS.</a:t>
             </a:r>
           </a:p>
           <a:p>
@@ -5644,7 +5637,6 @@
               <a:rPr lang="en-GB" dirty="0"/>
               <a:t>:</a:t>
             </a:r>
-            <a:endParaRPr lang="en-GB" dirty="0"/>
           </a:p>
         </p:txBody>
       </p:sp>
@@ -5675,15 +5667,7 @@
                   <a:srgbClr val="FF0000"/>
                 </a:solidFill>
               </a:rPr>
-              <a:t>Wouldn’t it be better to </a:t>
-            </a:r>
-            <a:r>
-              <a:rPr lang="en-GB" i="1" dirty="0">
-                <a:solidFill>
-                  <a:srgbClr val="FF0000"/>
-                </a:solidFill>
-              </a:rPr>
-              <a:t>develop and store as much as possible as </a:t>
+              <a:t>Wouldn’t it be better to develop and store as much as possible as </a:t>
             </a:r>
             <a:r>
               <a:rPr lang="en-GB" b="1" i="1" dirty="0">
@@ -5707,31 +5691,7 @@
                   <a:srgbClr val="FF0000"/>
                 </a:solidFill>
               </a:rPr>
-              <a:t> </a:t>
-            </a:r>
-            <a:r>
-              <a:rPr lang="en-GB" b="1" i="1" dirty="0">
-                <a:solidFill>
-                  <a:srgbClr val="FF0000"/>
-                </a:solidFill>
-              </a:rPr>
-              <a:t>information layer </a:t>
-            </a:r>
-            <a:r>
-              <a:rPr lang="en-GB" b="1" i="1" dirty="0">
-                <a:solidFill>
-                  <a:srgbClr val="FF0000"/>
-                </a:solidFill>
-              </a:rPr>
-              <a:t>(as opposed to bitmap figure</a:t>
-            </a:r>
-            <a:r>
-              <a:rPr lang="en-GB" b="1" i="1" dirty="0">
-                <a:solidFill>
-                  <a:srgbClr val="FF0000"/>
-                </a:solidFill>
-              </a:rPr>
-              <a:t>)? </a:t>
+              <a:t> information layer (as opposed to bitmap figure)? </a:t>
             </a:r>
           </a:p>
           <a:p>
@@ -5812,11 +5772,6 @@
               </a:rPr>
               <a:t>TEMPLATE</a:t>
             </a:r>
-            <a:endParaRPr lang="en-GB" sz="2400" dirty="0">
-              <a:solidFill>
-                <a:srgbClr val="FF0000"/>
-              </a:solidFill>
-            </a:endParaRPr>
           </a:p>
         </p:txBody>
       </p:sp>
@@ -5886,7 +5841,6 @@
               <a:rPr lang="en-GB" sz="5400" dirty="0"/>
               <a:t>#Abbrev, #Name</a:t>
             </a:r>
-            <a:endParaRPr lang="en-GB" sz="5400" dirty="0"/>
           </a:p>
         </p:txBody>
       </p:sp>
@@ -5917,21 +5871,8 @@
                   <a:srgbClr val="FF0000"/>
                 </a:solidFill>
               </a:rPr>
-              <a:t>Present known open issues with this slide: </a:t>
+              <a:t>Present known open issues with this slide: ###, ###, …</a:t>
             </a:r>
-            <a:r>
-              <a:rPr lang="en-GB" i="1" dirty="0">
-                <a:solidFill>
-                  <a:srgbClr val="FF0000"/>
-                </a:solidFill>
-              </a:rPr>
-              <a:t>###, ###, …</a:t>
-            </a:r>
-            <a:endParaRPr lang="en-GB" i="1" dirty="0">
-              <a:solidFill>
-                <a:srgbClr val="FF0000"/>
-              </a:solidFill>
-            </a:endParaRPr>
           </a:p>
         </p:txBody>
       </p:sp>
@@ -6197,23 +6138,7 @@
                   <a:schemeClr val="tx1"/>
                 </a:solidFill>
               </a:rPr>
-              <a:t>Present </a:t>
-            </a:r>
-            <a:r>
-              <a:rPr lang="en-GB" sz="1400" dirty="0">
-                <a:solidFill>
-                  <a:schemeClr val="tx1"/>
-                </a:solidFill>
-              </a:rPr>
-              <a:t>(</a:t>
-            </a:r>
-            <a:r>
-              <a:rPr lang="en-GB" sz="1400" dirty="0">
-                <a:solidFill>
-                  <a:schemeClr val="tx1"/>
-                </a:solidFill>
-              </a:rPr>
-              <a:t>20</a:t>
+              <a:t>Present (20</a:t>
             </a:r>
             <a:r>
               <a:rPr lang="en-GB" sz="1400" dirty="0">
@@ -6229,15 +6154,7 @@
                   <a:schemeClr val="tx1"/>
                 </a:solidFill>
               </a:rPr>
-              <a:t>) </a:t>
-            </a:r>
-            <a:r>
-              <a:rPr lang="en-GB" sz="1400" dirty="0">
-                <a:solidFill>
-                  <a:schemeClr val="tx1"/>
-                </a:solidFill>
-              </a:rPr>
-              <a:t>proposal from “HCT in </a:t>
+              <a:t>) proposal from “HCT in </a:t>
             </a:r>
             <a:r>
               <a:rPr lang="en-GB" sz="1400" dirty="0" err="1">
@@ -6253,21 +6170,8 @@
                   <a:schemeClr val="tx1"/>
                 </a:solidFill>
               </a:rPr>
-              <a:t>-project</a:t>
+              <a:t>-project”</a:t>
             </a:r>
-            <a:r>
-              <a:rPr lang="en-GB" sz="1400" dirty="0">
-                <a:solidFill>
-                  <a:schemeClr val="tx1"/>
-                </a:solidFill>
-              </a:rPr>
-              <a:t>”</a:t>
-            </a:r>
-            <a:endParaRPr lang="en-GB" sz="1400" dirty="0">
-              <a:solidFill>
-                <a:schemeClr val="tx1"/>
-              </a:solidFill>
-            </a:endParaRPr>
           </a:p>
         </p:txBody>
       </p:sp>
@@ -6331,11 +6235,6 @@
               </a:rPr>
               <a:t>###</a:t>
             </a:r>
-            <a:endParaRPr lang="en-GB" sz="1400" dirty="0">
-              <a:solidFill>
-                <a:srgbClr val="FF0000"/>
-              </a:solidFill>
-            </a:endParaRPr>
           </a:p>
         </p:txBody>
       </p:sp>
@@ -6379,7 +6278,6 @@
               <a:rPr lang="en-GB" sz="1400" dirty="0"/>
               <a:t>Mark which manoeuvre and measure in Open PBS Tool and in project:</a:t>
             </a:r>
-            <a:endParaRPr lang="en-GB" sz="1400" dirty="0"/>
           </a:p>
         </p:txBody>
       </p:sp>
@@ -8101,7 +7999,6 @@
               <a:rPr lang="en-GB" dirty="0"/>
               <a:t>FAI</a:t>
             </a:r>
-            <a:endParaRPr lang="en-GB" dirty="0"/>
           </a:p>
         </p:txBody>
       </p:sp>
@@ -8163,7 +8060,6 @@
               <a:rPr lang="en-GB" dirty="0"/>
               <a:t>RBM</a:t>
             </a:r>
-            <a:endParaRPr lang="en-GB" dirty="0"/>
           </a:p>
         </p:txBody>
       </p:sp>
@@ -8192,7 +8088,6 @@
               <a:rPr lang="en-GB" dirty="0"/>
               <a:t>FAM</a:t>
             </a:r>
-            <a:endParaRPr lang="en-GB" dirty="0"/>
           </a:p>
         </p:txBody>
       </p:sp>
@@ -8530,7 +8425,6 @@
               <a:rPr lang="en-GB" sz="1600" dirty="0"/>
               <a:t>WAM</a:t>
             </a:r>
-            <a:endParaRPr lang="en-GB" sz="1600" dirty="0"/>
           </a:p>
         </p:txBody>
       </p:sp>
@@ -8587,7 +8481,6 @@
               <a:rPr lang="en-GB" dirty="0"/>
               <a:t>FAO</a:t>
             </a:r>
-            <a:endParaRPr lang="en-GB" dirty="0"/>
           </a:p>
         </p:txBody>
       </p:sp>
@@ -8827,6 +8720,2452 @@
           </a:bodyPr>
           <a:lstStyle/>
           <a:p>
+            <a:pPr fontAlgn="ctr"/>
+            <a:r>
+              <a:rPr lang="en-US" sz="5400" b="0" dirty="0" smtClean="0"/>
+              <a:t>HSSO, High </a:t>
+            </a:r>
+            <a:r>
+              <a:rPr lang="en-US" sz="5400" b="0" dirty="0"/>
+              <a:t>Speed Steady State Off </a:t>
+            </a:r>
+            <a:r>
+              <a:rPr lang="en-US" sz="5400" b="0" dirty="0" smtClean="0"/>
+              <a:t>Tracking</a:t>
+            </a:r>
+            <a:endParaRPr lang="sv-SE" sz="5400" b="0" dirty="0"/>
+          </a:p>
+        </p:txBody>
+      </p:sp>
+      <p:sp>
+        <p:nvSpPr>
+          <p:cNvPr id="3" name="Rectangle 2"/>
+          <p:cNvSpPr/>
+          <p:nvPr/>
+        </p:nvSpPr>
+        <p:spPr>
+          <a:xfrm>
+            <a:off x="1967658" y="6047195"/>
+            <a:ext cx="9035143" cy="369332"/>
+          </a:xfrm>
+          <a:prstGeom prst="rect">
+            <a:avLst/>
+          </a:prstGeom>
+        </p:spPr>
+        <p:txBody>
+          <a:bodyPr wrap="square">
+            <a:spAutoFit/>
+          </a:bodyPr>
+          <a:lstStyle/>
+          <a:p>
+            <a:r>
+              <a:rPr lang="en-GB" i="1" dirty="0">
+                <a:solidFill>
+                  <a:srgbClr val="FF0000"/>
+                </a:solidFill>
+              </a:rPr>
+              <a:t>Present known open issues with this slide: ###, ###, …</a:t>
+            </a:r>
+          </a:p>
+        </p:txBody>
+      </p:sp>
+      <mc:AlternateContent xmlns:mc="http://schemas.openxmlformats.org/markup-compatibility/2006">
+        <mc:Choice xmlns:a14="http://schemas.microsoft.com/office/drawing/2010/main" Requires="a14">
+          <p:sp>
+            <p:nvSpPr>
+              <p:cNvPr id="18" name="TextBox 17"/>
+              <p:cNvSpPr txBox="1"/>
+              <p:nvPr/>
+            </p:nvSpPr>
+            <p:spPr>
+              <a:xfrm>
+                <a:off x="446315" y="3527640"/>
+                <a:ext cx="6825342" cy="2800767"/>
+              </a:xfrm>
+              <a:prstGeom prst="rect">
+                <a:avLst/>
+              </a:prstGeom>
+              <a:noFill/>
+            </p:spPr>
+            <p:txBody>
+              <a:bodyPr wrap="square" rtlCol="0">
+                <a:spAutoFit/>
+              </a:bodyPr>
+              <a:lstStyle/>
+              <a:p>
+                <a:r>
+                  <a:rPr lang="en-GB" b="1" dirty="0"/>
+                  <a:t>PBS manoeuvre</a:t>
+                </a:r>
+                <a:r>
+                  <a:rPr lang="en-GB" dirty="0"/>
+                  <a:t>: </a:t>
+                </a:r>
+                <a:r>
+                  <a:rPr lang="en-GB" dirty="0" smtClean="0"/>
+                  <a:t>SS constant radius, constant </a:t>
+                </a:r>
+                <a:r>
+                  <a:rPr lang="en-GB" b="1" dirty="0" smtClean="0"/>
+                  <a:t>Speed=80 km/h, ay=0.2, Unit loading=max.</a:t>
+                </a:r>
+                <a:r>
+                  <a:rPr lang="sv-SE" dirty="0" smtClean="0"/>
+                  <a:t> </a:t>
+                </a:r>
+              </a:p>
+              <a:p>
+                <a:r>
+                  <a:rPr lang="en-GB" b="1" dirty="0" smtClean="0"/>
+                  <a:t>Alternatives</a:t>
+                </a:r>
+                <a:r>
+                  <a:rPr lang="en-GB" dirty="0"/>
+                  <a:t>:</a:t>
+                </a:r>
+              </a:p>
+              <a:p>
+                <a:pPr marL="285750" indent="-285750">
+                  <a:buFont typeface="Arial" panose="020B0604020202020204" pitchFamily="34" charset="0"/>
+                  <a:buChar char="•"/>
+                </a:pPr>
+                <a14:m>
+                  <m:oMath xmlns:m="http://schemas.openxmlformats.org/officeDocument/2006/math">
+                    <m:r>
+                      <m:rPr>
+                        <m:nor/>
+                      </m:rPr>
+                      <a:rPr lang="en-GB" b="1" dirty="0"/>
+                      <m:t>Friction</m:t>
+                    </m:r>
+                    <m:r>
+                      <m:rPr>
+                        <m:nor/>
+                      </m:rPr>
+                      <a:rPr lang="en-GB" b="1" dirty="0"/>
+                      <m:t>=</m:t>
+                    </m:r>
+                    <m:r>
+                      <m:rPr>
+                        <m:nor/>
+                      </m:rPr>
+                      <a:rPr lang="sv-SE" b="1" i="0" dirty="0" smtClean="0"/>
+                      <m:t>high</m:t>
+                    </m:r>
+                  </m:oMath>
+                </a14:m>
+                <a:endParaRPr lang="sv-SE" dirty="0"/>
+              </a:p>
+              <a:p>
+                <a:pPr marL="285750" indent="-285750">
+                  <a:buFont typeface="Arial" panose="020B0604020202020204" pitchFamily="34" charset="0"/>
+                  <a:buChar char="•"/>
+                </a:pPr>
+                <a:r>
+                  <a:rPr lang="en-GB" b="1" dirty="0" smtClean="0"/>
+                  <a:t>Friction=</a:t>
+                </a:r>
+                <a:r>
+                  <a:rPr lang="en-GB" b="1" dirty="0" smtClean="0">
+                    <a:solidFill>
+                      <a:srgbClr val="FF0000"/>
+                    </a:solidFill>
+                  </a:rPr>
+                  <a:t>0.35 or 0.8 </a:t>
+                </a:r>
+                <a:r>
+                  <a:rPr lang="en-GB" sz="1200" b="1" dirty="0" smtClean="0">
+                    <a:solidFill>
+                      <a:srgbClr val="FF0000"/>
+                    </a:solidFill>
+                  </a:rPr>
+                  <a:t>(</a:t>
+                </a:r>
+                <a:r>
+                  <a:rPr lang="en-US" sz="1200" dirty="0" smtClean="0"/>
+                  <a:t>the </a:t>
+                </a:r>
+                <a:r>
+                  <a:rPr lang="en-US" sz="1200" dirty="0"/>
+                  <a:t>road maintenance guidelines for Sweden says that the friction should be at least 0.35 for main roads and 0.25 for minor </a:t>
+                </a:r>
+                <a:r>
+                  <a:rPr lang="en-US" sz="1200" dirty="0" smtClean="0"/>
+                  <a:t>roads</a:t>
+                </a:r>
+                <a:r>
+                  <a:rPr lang="en-GB" sz="1200" b="1" dirty="0" smtClean="0">
+                    <a:solidFill>
+                      <a:srgbClr val="FF0000"/>
+                    </a:solidFill>
+                  </a:rPr>
+                  <a:t>)</a:t>
+                </a:r>
+                <a:endParaRPr lang="sv-SE" sz="1200" dirty="0"/>
+              </a:p>
+              <a:p>
+                <a:r>
+                  <a:rPr lang="en-GB" b="1" dirty="0"/>
+                  <a:t>PBS measure</a:t>
+                </a:r>
+                <a:r>
+                  <a:rPr lang="en-GB" dirty="0"/>
+                  <a:t>: </a:t>
+                </a:r>
+                <a14:m>
+                  <m:oMath xmlns:m="http://schemas.openxmlformats.org/officeDocument/2006/math">
+                    <m:r>
+                      <a:rPr lang="sv-SE" i="1" dirty="0">
+                        <a:latin typeface="Cambria Math" panose="02040503050406030204" pitchFamily="18" charset="0"/>
+                      </a:rPr>
+                      <m:t>#;</m:t>
+                    </m:r>
+                  </m:oMath>
+                </a14:m>
+                <a:r>
+                  <a:rPr lang="sv-SE" dirty="0"/>
+                  <a:t>. </a:t>
+                </a:r>
+                <a:r>
+                  <a:rPr lang="en-GB" b="1" dirty="0"/>
+                  <a:t>Alternatives:</a:t>
+                </a:r>
+              </a:p>
+              <a:p>
+                <a:pPr marL="285750" indent="-285750">
+                  <a:buFont typeface="Arial" panose="020B0604020202020204" pitchFamily="34" charset="0"/>
+                  <a:buChar char="•"/>
+                </a:pPr>
+                <a:r>
+                  <a:rPr lang="en-GB" dirty="0"/>
+                  <a:t>###</a:t>
+                </a:r>
+              </a:p>
+              <a:p>
+                <a:pPr marL="285750" indent="-285750">
+                  <a:buFont typeface="Arial" panose="020B0604020202020204" pitchFamily="34" charset="0"/>
+                  <a:buChar char="•"/>
+                </a:pPr>
+                <a:r>
+                  <a:rPr lang="en-GB" dirty="0"/>
+                  <a:t>###</a:t>
+                </a:r>
+              </a:p>
+              <a:p>
+                <a:pPr marL="285750" indent="-285750">
+                  <a:buFont typeface="Arial" panose="020B0604020202020204" pitchFamily="34" charset="0"/>
+                  <a:buChar char="•"/>
+                </a:pPr>
+                <a:r>
+                  <a:rPr lang="en-GB" dirty="0"/>
+                  <a:t>###</a:t>
+                </a:r>
+              </a:p>
+            </p:txBody>
+          </p:sp>
+        </mc:Choice>
+        <mc:Fallback>
+          <p:sp>
+            <p:nvSpPr>
+              <p:cNvPr id="18" name="TextBox 17"/>
+              <p:cNvSpPr txBox="1">
+                <a:spLocks noRot="1" noChangeAspect="1" noMove="1" noResize="1" noEditPoints="1" noAdjustHandles="1" noChangeArrowheads="1" noChangeShapeType="1" noTextEdit="1"/>
+              </p:cNvSpPr>
+              <p:nvPr/>
+            </p:nvSpPr>
+            <p:spPr>
+              <a:xfrm>
+                <a:off x="446315" y="3527640"/>
+                <a:ext cx="6825342" cy="2800767"/>
+              </a:xfrm>
+              <a:prstGeom prst="rect">
+                <a:avLst/>
+              </a:prstGeom>
+              <a:blipFill rotWithShape="0">
+                <a:blip r:embed="rId2"/>
+                <a:stretch>
+                  <a:fillRect l="-714" t="-1307" b="-1525"/>
+                </a:stretch>
+              </a:blipFill>
+            </p:spPr>
+            <p:txBody>
+              <a:bodyPr/>
+              <a:lstStyle/>
+              <a:p>
+                <a:r>
+                  <a:rPr lang="en-GB">
+                    <a:noFill/>
+                  </a:rPr>
+                  <a:t> </a:t>
+                </a:r>
+              </a:p>
+            </p:txBody>
+          </p:sp>
+        </mc:Fallback>
+      </mc:AlternateContent>
+      <p:sp>
+        <p:nvSpPr>
+          <p:cNvPr id="19" name="Right Arrow 18"/>
+          <p:cNvSpPr/>
+          <p:nvPr/>
+        </p:nvSpPr>
+        <p:spPr>
+          <a:xfrm rot="20441268">
+            <a:off x="8837412" y="4927686"/>
+            <a:ext cx="2808709" cy="630912"/>
+          </a:xfrm>
+          <a:prstGeom prst="rightArrow">
+            <a:avLst>
+              <a:gd name="adj1" fmla="val 68030"/>
+              <a:gd name="adj2" fmla="val 115565"/>
+            </a:avLst>
+          </a:prstGeom>
+          <a:solidFill>
+            <a:srgbClr val="FFFF00"/>
+          </a:solidFill>
+        </p:spPr>
+        <p:style>
+          <a:lnRef idx="2">
+            <a:schemeClr val="accent1">
+              <a:shade val="50000"/>
+            </a:schemeClr>
+          </a:lnRef>
+          <a:fillRef idx="1">
+            <a:schemeClr val="accent1"/>
+          </a:fillRef>
+          <a:effectRef idx="0">
+            <a:schemeClr val="accent1"/>
+          </a:effectRef>
+          <a:fontRef idx="minor">
+            <a:schemeClr val="lt1"/>
+          </a:fontRef>
+        </p:style>
+        <p:txBody>
+          <a:bodyPr wrap="square" lIns="36000" tIns="0" rIns="36000" bIns="0" rtlCol="0" anchor="ctr">
+            <a:spAutoFit/>
+          </a:bodyPr>
+          <a:lstStyle/>
+          <a:p>
+            <a:pPr algn="ctr"/>
+            <a:r>
+              <a:rPr lang="en-GB" sz="1400" dirty="0">
+                <a:solidFill>
+                  <a:schemeClr val="tx1"/>
+                </a:solidFill>
+              </a:rPr>
+              <a:t>Present (20</a:t>
+            </a:r>
+            <a:r>
+              <a:rPr lang="en-GB" sz="1400" dirty="0">
+                <a:solidFill>
+                  <a:srgbClr val="FF0000"/>
+                </a:solidFill>
+              </a:rPr>
+              <a:t>##-##-##</a:t>
+            </a:r>
+            <a:r>
+              <a:rPr lang="en-GB" sz="1400" dirty="0">
+                <a:solidFill>
+                  <a:schemeClr val="tx1"/>
+                </a:solidFill>
+              </a:rPr>
+              <a:t>) proposal from “HCT in </a:t>
+            </a:r>
+            <a:r>
+              <a:rPr lang="en-GB" sz="1400" dirty="0" err="1">
+                <a:solidFill>
+                  <a:schemeClr val="tx1"/>
+                </a:solidFill>
+              </a:rPr>
+              <a:t>Swe</a:t>
+            </a:r>
+            <a:r>
+              <a:rPr lang="en-GB" sz="1400" dirty="0">
+                <a:solidFill>
+                  <a:schemeClr val="tx1"/>
+                </a:solidFill>
+              </a:rPr>
+              <a:t>-project”</a:t>
+            </a:r>
+          </a:p>
+        </p:txBody>
+      </p:sp>
+      <p:sp>
+        <p:nvSpPr>
+          <p:cNvPr id="28" name="Right Arrow 27"/>
+          <p:cNvSpPr/>
+          <p:nvPr/>
+        </p:nvSpPr>
+        <p:spPr>
+          <a:xfrm rot="20441268">
+            <a:off x="7732577" y="4715942"/>
+            <a:ext cx="2650604" cy="630912"/>
+          </a:xfrm>
+          <a:prstGeom prst="rightArrow">
+            <a:avLst>
+              <a:gd name="adj1" fmla="val 68030"/>
+              <a:gd name="adj2" fmla="val 106426"/>
+            </a:avLst>
+          </a:prstGeom>
+          <a:solidFill>
+            <a:srgbClr val="FFFF99"/>
+          </a:solidFill>
+        </p:spPr>
+        <p:style>
+          <a:lnRef idx="2">
+            <a:schemeClr val="accent1">
+              <a:shade val="50000"/>
+            </a:schemeClr>
+          </a:lnRef>
+          <a:fillRef idx="1">
+            <a:schemeClr val="accent1"/>
+          </a:fillRef>
+          <a:effectRef idx="0">
+            <a:schemeClr val="accent1"/>
+          </a:effectRef>
+          <a:fontRef idx="minor">
+            <a:schemeClr val="lt1"/>
+          </a:fontRef>
+        </p:style>
+        <p:txBody>
+          <a:bodyPr wrap="square" lIns="36000" tIns="0" rIns="36000" bIns="0" rtlCol="0" anchor="ctr">
+            <a:spAutoFit/>
+          </a:bodyPr>
+          <a:lstStyle/>
+          <a:p>
+            <a:pPr algn="ctr"/>
+            <a:r>
+              <a:rPr lang="en-GB" sz="1400" dirty="0">
+                <a:solidFill>
+                  <a:schemeClr val="tx1"/>
+                </a:solidFill>
+              </a:rPr>
+              <a:t>Implemented in Open PBS tool, version </a:t>
+            </a:r>
+            <a:r>
+              <a:rPr lang="en-GB" sz="1400" dirty="0">
+                <a:solidFill>
+                  <a:srgbClr val="FF0000"/>
+                </a:solidFill>
+              </a:rPr>
+              <a:t>###</a:t>
+            </a:r>
+          </a:p>
+        </p:txBody>
+      </p:sp>
+      <p:sp>
+        <p:nvSpPr>
+          <p:cNvPr id="29" name="TextBox 28"/>
+          <p:cNvSpPr txBox="1"/>
+          <p:nvPr/>
+        </p:nvSpPr>
+        <p:spPr>
+          <a:xfrm>
+            <a:off x="7685314" y="3418117"/>
+            <a:ext cx="4506686" cy="1169551"/>
+          </a:xfrm>
+          <a:prstGeom prst="rect">
+            <a:avLst/>
+          </a:prstGeom>
+          <a:noFill/>
+        </p:spPr>
+        <p:txBody>
+          <a:bodyPr wrap="square" rtlCol="0">
+            <a:spAutoFit/>
+          </a:bodyPr>
+          <a:lstStyle/>
+          <a:p>
+            <a:pPr marL="285750" indent="-285750">
+              <a:buFont typeface="Arial" panose="020B0604020202020204" pitchFamily="34" charset="0"/>
+              <a:buChar char="•"/>
+            </a:pPr>
+            <a:r>
+              <a:rPr lang="en-GB" sz="1400" dirty="0"/>
+              <a:t>Some relevant alternatives to be presented, in order to document and agree also which alternatives are deselected, and possibly why.</a:t>
+            </a:r>
+          </a:p>
+          <a:p>
+            <a:pPr marL="285750" indent="-285750">
+              <a:buFont typeface="Arial" panose="020B0604020202020204" pitchFamily="34" charset="0"/>
+              <a:buChar char="•"/>
+            </a:pPr>
+            <a:r>
+              <a:rPr lang="en-GB" sz="1400" dirty="0"/>
+              <a:t>Mark which manoeuvre and measure in Open PBS Tool and in project:</a:t>
+            </a:r>
+          </a:p>
+        </p:txBody>
+      </p:sp>
+      <p:sp>
+        <p:nvSpPr>
+          <p:cNvPr id="42" name="Arc 41"/>
+          <p:cNvSpPr>
+            <a:spLocks noChangeAspect="1"/>
+          </p:cNvSpPr>
+          <p:nvPr/>
+        </p:nvSpPr>
+        <p:spPr>
+          <a:xfrm>
+            <a:off x="5668862" y="977594"/>
+            <a:ext cx="2746755" cy="2746755"/>
+          </a:xfrm>
+          <a:prstGeom prst="arc">
+            <a:avLst>
+              <a:gd name="adj1" fmla="val 21012041"/>
+              <a:gd name="adj2" fmla="val 0"/>
+            </a:avLst>
+          </a:prstGeom>
+          <a:ln>
+            <a:headEnd type="triangle" w="med" len="med"/>
+            <a:tailEnd type="none" w="med" len="med"/>
+          </a:ln>
+        </p:spPr>
+        <p:style>
+          <a:lnRef idx="1">
+            <a:schemeClr val="accent1"/>
+          </a:lnRef>
+          <a:fillRef idx="0">
+            <a:schemeClr val="accent1"/>
+          </a:fillRef>
+          <a:effectRef idx="0">
+            <a:schemeClr val="accent1"/>
+          </a:effectRef>
+          <a:fontRef idx="minor">
+            <a:schemeClr val="tx1"/>
+          </a:fontRef>
+        </p:style>
+        <p:txBody>
+          <a:bodyPr rtlCol="0" anchor="ctr"/>
+          <a:lstStyle/>
+          <a:p>
+            <a:pPr algn="ctr"/>
+            <a:endParaRPr lang="en-GB"/>
+          </a:p>
+        </p:txBody>
+      </p:sp>
+      <p:grpSp>
+        <p:nvGrpSpPr>
+          <p:cNvPr id="46" name="Group 45"/>
+          <p:cNvGrpSpPr/>
+          <p:nvPr/>
+        </p:nvGrpSpPr>
+        <p:grpSpPr>
+          <a:xfrm>
+            <a:off x="3762808" y="1757073"/>
+            <a:ext cx="1929912" cy="811822"/>
+            <a:chOff x="5251938" y="2417885"/>
+            <a:chExt cx="1929912" cy="811822"/>
+          </a:xfrm>
+        </p:grpSpPr>
+        <p:sp>
+          <p:nvSpPr>
+            <p:cNvPr id="47" name="Rectangle 46"/>
+            <p:cNvSpPr/>
+            <p:nvPr/>
+          </p:nvSpPr>
+          <p:spPr>
+            <a:xfrm>
+              <a:off x="5251938" y="2420815"/>
+              <a:ext cx="1929912" cy="808892"/>
+            </a:xfrm>
+            <a:prstGeom prst="rect">
+              <a:avLst/>
+            </a:prstGeom>
+            <a:solidFill>
+              <a:schemeClr val="accent1">
+                <a:alpha val="50000"/>
+              </a:schemeClr>
+            </a:solidFill>
+            <a:ln>
+              <a:solidFill>
+                <a:schemeClr val="tx1"/>
+              </a:solidFill>
+            </a:ln>
+          </p:spPr>
+          <p:style>
+            <a:lnRef idx="2">
+              <a:schemeClr val="accent1">
+                <a:shade val="50000"/>
+              </a:schemeClr>
+            </a:lnRef>
+            <a:fillRef idx="1">
+              <a:schemeClr val="accent1"/>
+            </a:fillRef>
+            <a:effectRef idx="0">
+              <a:schemeClr val="accent1"/>
+            </a:effectRef>
+            <a:fontRef idx="minor">
+              <a:schemeClr val="lt1"/>
+            </a:fontRef>
+          </p:style>
+          <p:txBody>
+            <a:bodyPr rtlCol="0" anchor="ctr"/>
+            <a:lstStyle/>
+            <a:p>
+              <a:pPr algn="ctr"/>
+              <a:endParaRPr lang="en-GB"/>
+            </a:p>
+          </p:txBody>
+        </p:sp>
+        <p:sp>
+          <p:nvSpPr>
+            <p:cNvPr id="48" name="Isosceles Triangle 47"/>
+            <p:cNvSpPr/>
+            <p:nvPr/>
+          </p:nvSpPr>
+          <p:spPr>
+            <a:xfrm rot="5400000">
+              <a:off x="6018334" y="2598127"/>
+              <a:ext cx="800100" cy="439616"/>
+            </a:xfrm>
+            <a:prstGeom prst="triangle">
+              <a:avLst/>
+            </a:prstGeom>
+            <a:noFill/>
+          </p:spPr>
+          <p:style>
+            <a:lnRef idx="2">
+              <a:schemeClr val="accent1">
+                <a:shade val="50000"/>
+              </a:schemeClr>
+            </a:lnRef>
+            <a:fillRef idx="1">
+              <a:schemeClr val="accent1"/>
+            </a:fillRef>
+            <a:effectRef idx="0">
+              <a:schemeClr val="accent1"/>
+            </a:effectRef>
+            <a:fontRef idx="minor">
+              <a:schemeClr val="lt1"/>
+            </a:fontRef>
+          </p:style>
+          <p:txBody>
+            <a:bodyPr rtlCol="0" anchor="ctr"/>
+            <a:lstStyle/>
+            <a:p>
+              <a:pPr algn="ctr"/>
+              <a:endParaRPr lang="en-GB"/>
+            </a:p>
+          </p:txBody>
+        </p:sp>
+        <p:sp>
+          <p:nvSpPr>
+            <p:cNvPr id="49" name="Rectangle 48"/>
+            <p:cNvSpPr/>
+            <p:nvPr/>
+          </p:nvSpPr>
+          <p:spPr>
+            <a:xfrm>
+              <a:off x="6542118" y="2426677"/>
+              <a:ext cx="334108" cy="123093"/>
+            </a:xfrm>
+            <a:prstGeom prst="rect">
+              <a:avLst/>
+            </a:prstGeom>
+            <a:solidFill>
+              <a:schemeClr val="tx1"/>
+            </a:solidFill>
+          </p:spPr>
+          <p:style>
+            <a:lnRef idx="2">
+              <a:schemeClr val="accent1">
+                <a:shade val="50000"/>
+              </a:schemeClr>
+            </a:lnRef>
+            <a:fillRef idx="1">
+              <a:schemeClr val="accent1"/>
+            </a:fillRef>
+            <a:effectRef idx="0">
+              <a:schemeClr val="accent1"/>
+            </a:effectRef>
+            <a:fontRef idx="minor">
+              <a:schemeClr val="lt1"/>
+            </a:fontRef>
+          </p:style>
+          <p:txBody>
+            <a:bodyPr rtlCol="0" anchor="ctr"/>
+            <a:lstStyle/>
+            <a:p>
+              <a:pPr algn="ctr"/>
+              <a:endParaRPr lang="en-GB"/>
+            </a:p>
+          </p:txBody>
+        </p:sp>
+        <p:sp>
+          <p:nvSpPr>
+            <p:cNvPr id="50" name="Rectangle 49"/>
+            <p:cNvSpPr/>
+            <p:nvPr/>
+          </p:nvSpPr>
+          <p:spPr>
+            <a:xfrm>
+              <a:off x="6542118" y="3099837"/>
+              <a:ext cx="334108" cy="123093"/>
+            </a:xfrm>
+            <a:prstGeom prst="rect">
+              <a:avLst/>
+            </a:prstGeom>
+            <a:solidFill>
+              <a:schemeClr val="tx1"/>
+            </a:solidFill>
+          </p:spPr>
+          <p:style>
+            <a:lnRef idx="2">
+              <a:schemeClr val="accent1">
+                <a:shade val="50000"/>
+              </a:schemeClr>
+            </a:lnRef>
+            <a:fillRef idx="1">
+              <a:schemeClr val="accent1"/>
+            </a:fillRef>
+            <a:effectRef idx="0">
+              <a:schemeClr val="accent1"/>
+            </a:effectRef>
+            <a:fontRef idx="minor">
+              <a:schemeClr val="lt1"/>
+            </a:fontRef>
+          </p:style>
+          <p:txBody>
+            <a:bodyPr rtlCol="0" anchor="ctr"/>
+            <a:lstStyle/>
+            <a:p>
+              <a:pPr algn="ctr"/>
+              <a:endParaRPr lang="en-GB"/>
+            </a:p>
+          </p:txBody>
+        </p:sp>
+        <p:sp>
+          <p:nvSpPr>
+            <p:cNvPr id="51" name="Rectangle 50"/>
+            <p:cNvSpPr/>
+            <p:nvPr/>
+          </p:nvSpPr>
+          <p:spPr>
+            <a:xfrm>
+              <a:off x="5515799" y="2426677"/>
+              <a:ext cx="334108" cy="123093"/>
+            </a:xfrm>
+            <a:prstGeom prst="rect">
+              <a:avLst/>
+            </a:prstGeom>
+            <a:solidFill>
+              <a:schemeClr val="tx1"/>
+            </a:solidFill>
+          </p:spPr>
+          <p:style>
+            <a:lnRef idx="2">
+              <a:schemeClr val="accent1">
+                <a:shade val="50000"/>
+              </a:schemeClr>
+            </a:lnRef>
+            <a:fillRef idx="1">
+              <a:schemeClr val="accent1"/>
+            </a:fillRef>
+            <a:effectRef idx="0">
+              <a:schemeClr val="accent1"/>
+            </a:effectRef>
+            <a:fontRef idx="minor">
+              <a:schemeClr val="lt1"/>
+            </a:fontRef>
+          </p:style>
+          <p:txBody>
+            <a:bodyPr rtlCol="0" anchor="ctr"/>
+            <a:lstStyle/>
+            <a:p>
+              <a:pPr algn="ctr"/>
+              <a:endParaRPr lang="en-GB"/>
+            </a:p>
+          </p:txBody>
+        </p:sp>
+        <p:sp>
+          <p:nvSpPr>
+            <p:cNvPr id="52" name="Rectangle 51"/>
+            <p:cNvSpPr/>
+            <p:nvPr/>
+          </p:nvSpPr>
+          <p:spPr>
+            <a:xfrm>
+              <a:off x="5515799" y="3099837"/>
+              <a:ext cx="334108" cy="123093"/>
+            </a:xfrm>
+            <a:prstGeom prst="rect">
+              <a:avLst/>
+            </a:prstGeom>
+            <a:solidFill>
+              <a:schemeClr val="tx1"/>
+            </a:solidFill>
+          </p:spPr>
+          <p:style>
+            <a:lnRef idx="2">
+              <a:schemeClr val="accent1">
+                <a:shade val="50000"/>
+              </a:schemeClr>
+            </a:lnRef>
+            <a:fillRef idx="1">
+              <a:schemeClr val="accent1"/>
+            </a:fillRef>
+            <a:effectRef idx="0">
+              <a:schemeClr val="accent1"/>
+            </a:effectRef>
+            <a:fontRef idx="minor">
+              <a:schemeClr val="lt1"/>
+            </a:fontRef>
+          </p:style>
+          <p:txBody>
+            <a:bodyPr rtlCol="0" anchor="ctr"/>
+            <a:lstStyle/>
+            <a:p>
+              <a:pPr algn="ctr"/>
+              <a:endParaRPr lang="en-GB"/>
+            </a:p>
+          </p:txBody>
+        </p:sp>
+        <p:sp>
+          <p:nvSpPr>
+            <p:cNvPr id="53" name="Oval 52"/>
+            <p:cNvSpPr/>
+            <p:nvPr/>
+          </p:nvSpPr>
+          <p:spPr>
+            <a:xfrm>
+              <a:off x="5276850" y="2776538"/>
+              <a:ext cx="109538" cy="109537"/>
+            </a:xfrm>
+            <a:prstGeom prst="ellipse">
+              <a:avLst/>
+            </a:prstGeom>
+          </p:spPr>
+          <p:style>
+            <a:lnRef idx="2">
+              <a:schemeClr val="accent1">
+                <a:shade val="50000"/>
+              </a:schemeClr>
+            </a:lnRef>
+            <a:fillRef idx="1">
+              <a:schemeClr val="accent1"/>
+            </a:fillRef>
+            <a:effectRef idx="0">
+              <a:schemeClr val="accent1"/>
+            </a:effectRef>
+            <a:fontRef idx="minor">
+              <a:schemeClr val="lt1"/>
+            </a:fontRef>
+          </p:style>
+          <p:txBody>
+            <a:bodyPr rtlCol="0" anchor="ctr"/>
+            <a:lstStyle/>
+            <a:p>
+              <a:pPr algn="ctr"/>
+              <a:endParaRPr lang="en-GB"/>
+            </a:p>
+          </p:txBody>
+        </p:sp>
+      </p:grpSp>
+      <p:grpSp>
+        <p:nvGrpSpPr>
+          <p:cNvPr id="54" name="Group 53"/>
+          <p:cNvGrpSpPr/>
+          <p:nvPr/>
+        </p:nvGrpSpPr>
+        <p:grpSpPr>
+          <a:xfrm>
+            <a:off x="1930833" y="1759515"/>
+            <a:ext cx="2039816" cy="808892"/>
+            <a:chOff x="2813538" y="2426677"/>
+            <a:chExt cx="2039816" cy="808892"/>
+          </a:xfrm>
+        </p:grpSpPr>
+        <p:sp>
+          <p:nvSpPr>
+            <p:cNvPr id="55" name="Rectangle 54"/>
+            <p:cNvSpPr/>
+            <p:nvPr/>
+          </p:nvSpPr>
+          <p:spPr>
+            <a:xfrm>
+              <a:off x="2813538" y="2426677"/>
+              <a:ext cx="2039816" cy="808892"/>
+            </a:xfrm>
+            <a:prstGeom prst="rect">
+              <a:avLst/>
+            </a:prstGeom>
+            <a:solidFill>
+              <a:schemeClr val="accent1">
+                <a:alpha val="50000"/>
+              </a:schemeClr>
+            </a:solidFill>
+            <a:ln>
+              <a:solidFill>
+                <a:schemeClr val="tx1"/>
+              </a:solidFill>
+            </a:ln>
+          </p:spPr>
+          <p:style>
+            <a:lnRef idx="2">
+              <a:schemeClr val="accent1">
+                <a:shade val="50000"/>
+              </a:schemeClr>
+            </a:lnRef>
+            <a:fillRef idx="1">
+              <a:schemeClr val="accent1"/>
+            </a:fillRef>
+            <a:effectRef idx="0">
+              <a:schemeClr val="accent1"/>
+            </a:effectRef>
+            <a:fontRef idx="minor">
+              <a:schemeClr val="lt1"/>
+            </a:fontRef>
+          </p:style>
+          <p:txBody>
+            <a:bodyPr rtlCol="0" anchor="ctr"/>
+            <a:lstStyle/>
+            <a:p>
+              <a:pPr algn="ctr"/>
+              <a:endParaRPr lang="en-GB"/>
+            </a:p>
+          </p:txBody>
+        </p:sp>
+        <p:sp>
+          <p:nvSpPr>
+            <p:cNvPr id="56" name="Rectangle 55"/>
+            <p:cNvSpPr/>
+            <p:nvPr/>
+          </p:nvSpPr>
+          <p:spPr>
+            <a:xfrm>
+              <a:off x="3094068" y="2431440"/>
+              <a:ext cx="334108" cy="123093"/>
+            </a:xfrm>
+            <a:prstGeom prst="rect">
+              <a:avLst/>
+            </a:prstGeom>
+            <a:solidFill>
+              <a:schemeClr val="tx1"/>
+            </a:solidFill>
+          </p:spPr>
+          <p:style>
+            <a:lnRef idx="2">
+              <a:schemeClr val="accent1">
+                <a:shade val="50000"/>
+              </a:schemeClr>
+            </a:lnRef>
+            <a:fillRef idx="1">
+              <a:schemeClr val="accent1"/>
+            </a:fillRef>
+            <a:effectRef idx="0">
+              <a:schemeClr val="accent1"/>
+            </a:effectRef>
+            <a:fontRef idx="minor">
+              <a:schemeClr val="lt1"/>
+            </a:fontRef>
+          </p:style>
+          <p:txBody>
+            <a:bodyPr rtlCol="0" anchor="ctr"/>
+            <a:lstStyle/>
+            <a:p>
+              <a:pPr algn="ctr"/>
+              <a:endParaRPr lang="en-GB"/>
+            </a:p>
+          </p:txBody>
+        </p:sp>
+        <p:sp>
+          <p:nvSpPr>
+            <p:cNvPr id="57" name="Rectangle 56"/>
+            <p:cNvSpPr/>
+            <p:nvPr/>
+          </p:nvSpPr>
+          <p:spPr>
+            <a:xfrm>
+              <a:off x="3094068" y="3104600"/>
+              <a:ext cx="334108" cy="123093"/>
+            </a:xfrm>
+            <a:prstGeom prst="rect">
+              <a:avLst/>
+            </a:prstGeom>
+            <a:solidFill>
+              <a:schemeClr val="tx1"/>
+            </a:solidFill>
+          </p:spPr>
+          <p:style>
+            <a:lnRef idx="2">
+              <a:schemeClr val="accent1">
+                <a:shade val="50000"/>
+              </a:schemeClr>
+            </a:lnRef>
+            <a:fillRef idx="1">
+              <a:schemeClr val="accent1"/>
+            </a:fillRef>
+            <a:effectRef idx="0">
+              <a:schemeClr val="accent1"/>
+            </a:effectRef>
+            <a:fontRef idx="minor">
+              <a:schemeClr val="lt1"/>
+            </a:fontRef>
+          </p:style>
+          <p:txBody>
+            <a:bodyPr rtlCol="0" anchor="ctr"/>
+            <a:lstStyle/>
+            <a:p>
+              <a:pPr algn="ctr"/>
+              <a:endParaRPr lang="en-GB"/>
+            </a:p>
+          </p:txBody>
+        </p:sp>
+        <p:sp>
+          <p:nvSpPr>
+            <p:cNvPr id="58" name="Oval 57"/>
+            <p:cNvSpPr/>
+            <p:nvPr/>
+          </p:nvSpPr>
+          <p:spPr>
+            <a:xfrm>
+              <a:off x="4676775" y="2776538"/>
+              <a:ext cx="109538" cy="109537"/>
+            </a:xfrm>
+            <a:prstGeom prst="ellipse">
+              <a:avLst/>
+            </a:prstGeom>
+          </p:spPr>
+          <p:style>
+            <a:lnRef idx="2">
+              <a:schemeClr val="accent1">
+                <a:shade val="50000"/>
+              </a:schemeClr>
+            </a:lnRef>
+            <a:fillRef idx="1">
+              <a:schemeClr val="accent1"/>
+            </a:fillRef>
+            <a:effectRef idx="0">
+              <a:schemeClr val="accent1"/>
+            </a:effectRef>
+            <a:fontRef idx="minor">
+              <a:schemeClr val="lt1"/>
+            </a:fontRef>
+          </p:style>
+          <p:txBody>
+            <a:bodyPr rtlCol="0" anchor="ctr"/>
+            <a:lstStyle/>
+            <a:p>
+              <a:pPr algn="ctr"/>
+              <a:endParaRPr lang="en-GB"/>
+            </a:p>
+          </p:txBody>
+        </p:sp>
+      </p:grpSp>
+      <p:sp>
+        <p:nvSpPr>
+          <p:cNvPr id="59" name="Oval 58"/>
+          <p:cNvSpPr/>
+          <p:nvPr/>
+        </p:nvSpPr>
+        <p:spPr>
+          <a:xfrm>
+            <a:off x="5178370" y="2514188"/>
+            <a:ext cx="101600" cy="101600"/>
+          </a:xfrm>
+          <a:prstGeom prst="ellipse">
+            <a:avLst/>
+          </a:prstGeom>
+          <a:solidFill>
+            <a:srgbClr val="FF0000"/>
+          </a:solidFill>
+          <a:ln w="38100">
+            <a:solidFill>
+              <a:srgbClr val="FFFF00"/>
+            </a:solidFill>
+          </a:ln>
+        </p:spPr>
+        <p:style>
+          <a:lnRef idx="2">
+            <a:schemeClr val="accent1">
+              <a:shade val="50000"/>
+            </a:schemeClr>
+          </a:lnRef>
+          <a:fillRef idx="1">
+            <a:schemeClr val="accent1"/>
+          </a:fillRef>
+          <a:effectRef idx="0">
+            <a:schemeClr val="accent1"/>
+          </a:effectRef>
+          <a:fontRef idx="minor">
+            <a:schemeClr val="lt1"/>
+          </a:fontRef>
+        </p:style>
+        <p:txBody>
+          <a:bodyPr rtlCol="0" anchor="ctr"/>
+          <a:lstStyle/>
+          <a:p>
+            <a:pPr algn="ctr"/>
+            <a:endParaRPr lang="en-GB"/>
+          </a:p>
+        </p:txBody>
+      </p:sp>
+      <p:sp>
+        <p:nvSpPr>
+          <p:cNvPr id="60" name="Oval 59"/>
+          <p:cNvSpPr/>
+          <p:nvPr/>
+        </p:nvSpPr>
+        <p:spPr>
+          <a:xfrm>
+            <a:off x="5622870" y="2514188"/>
+            <a:ext cx="101600" cy="101600"/>
+          </a:xfrm>
+          <a:prstGeom prst="ellipse">
+            <a:avLst/>
+          </a:prstGeom>
+          <a:solidFill>
+            <a:srgbClr val="FF0000"/>
+          </a:solidFill>
+          <a:ln w="38100">
+            <a:solidFill>
+              <a:srgbClr val="FFFF00"/>
+            </a:solidFill>
+          </a:ln>
+        </p:spPr>
+        <p:style>
+          <a:lnRef idx="2">
+            <a:schemeClr val="accent1">
+              <a:shade val="50000"/>
+            </a:schemeClr>
+          </a:lnRef>
+          <a:fillRef idx="1">
+            <a:schemeClr val="accent1"/>
+          </a:fillRef>
+          <a:effectRef idx="0">
+            <a:schemeClr val="accent1"/>
+          </a:effectRef>
+          <a:fontRef idx="minor">
+            <a:schemeClr val="lt1"/>
+          </a:fontRef>
+        </p:style>
+        <p:txBody>
+          <a:bodyPr rtlCol="0" anchor="ctr"/>
+          <a:lstStyle/>
+          <a:p>
+            <a:pPr algn="ctr"/>
+            <a:endParaRPr lang="en-GB"/>
+          </a:p>
+        </p:txBody>
+      </p:sp>
+      <p:sp>
+        <p:nvSpPr>
+          <p:cNvPr id="61" name="Oval 60"/>
+          <p:cNvSpPr/>
+          <p:nvPr/>
+        </p:nvSpPr>
+        <p:spPr>
+          <a:xfrm>
+            <a:off x="5178370" y="2095088"/>
+            <a:ext cx="101600" cy="101600"/>
+          </a:xfrm>
+          <a:prstGeom prst="ellipse">
+            <a:avLst/>
+          </a:prstGeom>
+          <a:solidFill>
+            <a:srgbClr val="FF0000"/>
+          </a:solidFill>
+          <a:ln>
+            <a:solidFill>
+              <a:srgbClr val="FF0000"/>
+            </a:solidFill>
+          </a:ln>
+        </p:spPr>
+        <p:style>
+          <a:lnRef idx="2">
+            <a:schemeClr val="accent1">
+              <a:shade val="50000"/>
+            </a:schemeClr>
+          </a:lnRef>
+          <a:fillRef idx="1">
+            <a:schemeClr val="accent1"/>
+          </a:fillRef>
+          <a:effectRef idx="0">
+            <a:schemeClr val="accent1"/>
+          </a:effectRef>
+          <a:fontRef idx="minor">
+            <a:schemeClr val="lt1"/>
+          </a:fontRef>
+        </p:style>
+        <p:txBody>
+          <a:bodyPr rtlCol="0" anchor="ctr"/>
+          <a:lstStyle/>
+          <a:p>
+            <a:pPr algn="ctr"/>
+            <a:endParaRPr lang="en-GB"/>
+          </a:p>
+        </p:txBody>
+      </p:sp>
+      <p:sp>
+        <p:nvSpPr>
+          <p:cNvPr id="62" name="Oval 61"/>
+          <p:cNvSpPr/>
+          <p:nvPr/>
+        </p:nvSpPr>
+        <p:spPr>
+          <a:xfrm>
+            <a:off x="5622870" y="2095088"/>
+            <a:ext cx="101600" cy="101600"/>
+          </a:xfrm>
+          <a:prstGeom prst="ellipse">
+            <a:avLst/>
+          </a:prstGeom>
+          <a:solidFill>
+            <a:srgbClr val="FF0000"/>
+          </a:solidFill>
+          <a:ln>
+            <a:solidFill>
+              <a:srgbClr val="FF0000"/>
+            </a:solidFill>
+          </a:ln>
+        </p:spPr>
+        <p:style>
+          <a:lnRef idx="2">
+            <a:schemeClr val="accent1">
+              <a:shade val="50000"/>
+            </a:schemeClr>
+          </a:lnRef>
+          <a:fillRef idx="1">
+            <a:schemeClr val="accent1"/>
+          </a:fillRef>
+          <a:effectRef idx="0">
+            <a:schemeClr val="accent1"/>
+          </a:effectRef>
+          <a:fontRef idx="minor">
+            <a:schemeClr val="lt1"/>
+          </a:fontRef>
+        </p:style>
+        <p:txBody>
+          <a:bodyPr rtlCol="0" anchor="ctr"/>
+          <a:lstStyle/>
+          <a:p>
+            <a:pPr algn="ctr"/>
+            <a:endParaRPr lang="en-GB"/>
+          </a:p>
+        </p:txBody>
+      </p:sp>
+      <p:sp>
+        <p:nvSpPr>
+          <p:cNvPr id="63" name="Oval 62"/>
+          <p:cNvSpPr/>
+          <p:nvPr/>
+        </p:nvSpPr>
+        <p:spPr>
+          <a:xfrm>
+            <a:off x="5191070" y="1726788"/>
+            <a:ext cx="101600" cy="101600"/>
+          </a:xfrm>
+          <a:prstGeom prst="ellipse">
+            <a:avLst/>
+          </a:prstGeom>
+          <a:solidFill>
+            <a:srgbClr val="FF0000"/>
+          </a:solidFill>
+          <a:ln>
+            <a:solidFill>
+              <a:srgbClr val="FF0000"/>
+            </a:solidFill>
+          </a:ln>
+        </p:spPr>
+        <p:style>
+          <a:lnRef idx="2">
+            <a:schemeClr val="accent1">
+              <a:shade val="50000"/>
+            </a:schemeClr>
+          </a:lnRef>
+          <a:fillRef idx="1">
+            <a:schemeClr val="accent1"/>
+          </a:fillRef>
+          <a:effectRef idx="0">
+            <a:schemeClr val="accent1"/>
+          </a:effectRef>
+          <a:fontRef idx="minor">
+            <a:schemeClr val="lt1"/>
+          </a:fontRef>
+        </p:style>
+        <p:txBody>
+          <a:bodyPr rtlCol="0" anchor="ctr"/>
+          <a:lstStyle/>
+          <a:p>
+            <a:pPr algn="ctr"/>
+            <a:endParaRPr lang="en-GB"/>
+          </a:p>
+        </p:txBody>
+      </p:sp>
+      <p:sp>
+        <p:nvSpPr>
+          <p:cNvPr id="64" name="Oval 63"/>
+          <p:cNvSpPr/>
+          <p:nvPr/>
+        </p:nvSpPr>
+        <p:spPr>
+          <a:xfrm>
+            <a:off x="5635570" y="1726788"/>
+            <a:ext cx="101600" cy="101600"/>
+          </a:xfrm>
+          <a:prstGeom prst="ellipse">
+            <a:avLst/>
+          </a:prstGeom>
+          <a:solidFill>
+            <a:srgbClr val="FF0000"/>
+          </a:solidFill>
+          <a:ln>
+            <a:solidFill>
+              <a:srgbClr val="FF0000"/>
+            </a:solidFill>
+          </a:ln>
+        </p:spPr>
+        <p:style>
+          <a:lnRef idx="2">
+            <a:schemeClr val="accent1">
+              <a:shade val="50000"/>
+            </a:schemeClr>
+          </a:lnRef>
+          <a:fillRef idx="1">
+            <a:schemeClr val="accent1"/>
+          </a:fillRef>
+          <a:effectRef idx="0">
+            <a:schemeClr val="accent1"/>
+          </a:effectRef>
+          <a:fontRef idx="minor">
+            <a:schemeClr val="lt1"/>
+          </a:fontRef>
+        </p:style>
+        <p:txBody>
+          <a:bodyPr rtlCol="0" anchor="ctr"/>
+          <a:lstStyle/>
+          <a:p>
+            <a:pPr algn="ctr"/>
+            <a:endParaRPr lang="en-GB"/>
+          </a:p>
+        </p:txBody>
+      </p:sp>
+      <p:sp>
+        <p:nvSpPr>
+          <p:cNvPr id="65" name="Oval 64"/>
+          <p:cNvSpPr/>
+          <p:nvPr/>
+        </p:nvSpPr>
+        <p:spPr>
+          <a:xfrm>
+            <a:off x="1863670" y="2514188"/>
+            <a:ext cx="101600" cy="101600"/>
+          </a:xfrm>
+          <a:prstGeom prst="ellipse">
+            <a:avLst/>
+          </a:prstGeom>
+          <a:solidFill>
+            <a:srgbClr val="FF0000"/>
+          </a:solidFill>
+          <a:ln>
+            <a:solidFill>
+              <a:srgbClr val="FF0000"/>
+            </a:solidFill>
+          </a:ln>
+        </p:spPr>
+        <p:style>
+          <a:lnRef idx="2">
+            <a:schemeClr val="accent1">
+              <a:shade val="50000"/>
+            </a:schemeClr>
+          </a:lnRef>
+          <a:fillRef idx="1">
+            <a:schemeClr val="accent1"/>
+          </a:fillRef>
+          <a:effectRef idx="0">
+            <a:schemeClr val="accent1"/>
+          </a:effectRef>
+          <a:fontRef idx="minor">
+            <a:schemeClr val="lt1"/>
+          </a:fontRef>
+        </p:style>
+        <p:txBody>
+          <a:bodyPr rtlCol="0" anchor="ctr"/>
+          <a:lstStyle/>
+          <a:p>
+            <a:pPr algn="ctr"/>
+            <a:endParaRPr lang="en-GB"/>
+          </a:p>
+        </p:txBody>
+      </p:sp>
+      <p:sp>
+        <p:nvSpPr>
+          <p:cNvPr id="66" name="Oval 65"/>
+          <p:cNvSpPr/>
+          <p:nvPr/>
+        </p:nvSpPr>
+        <p:spPr>
+          <a:xfrm>
+            <a:off x="2308170" y="2514188"/>
+            <a:ext cx="101600" cy="101600"/>
+          </a:xfrm>
+          <a:prstGeom prst="ellipse">
+            <a:avLst/>
+          </a:prstGeom>
+          <a:solidFill>
+            <a:srgbClr val="FF0000"/>
+          </a:solidFill>
+          <a:ln>
+            <a:solidFill>
+              <a:srgbClr val="FF0000"/>
+            </a:solidFill>
+          </a:ln>
+        </p:spPr>
+        <p:style>
+          <a:lnRef idx="2">
+            <a:schemeClr val="accent1">
+              <a:shade val="50000"/>
+            </a:schemeClr>
+          </a:lnRef>
+          <a:fillRef idx="1">
+            <a:schemeClr val="accent1"/>
+          </a:fillRef>
+          <a:effectRef idx="0">
+            <a:schemeClr val="accent1"/>
+          </a:effectRef>
+          <a:fontRef idx="minor">
+            <a:schemeClr val="lt1"/>
+          </a:fontRef>
+        </p:style>
+        <p:txBody>
+          <a:bodyPr rtlCol="0" anchor="ctr"/>
+          <a:lstStyle/>
+          <a:p>
+            <a:pPr algn="ctr"/>
+            <a:endParaRPr lang="en-GB"/>
+          </a:p>
+        </p:txBody>
+      </p:sp>
+      <p:sp>
+        <p:nvSpPr>
+          <p:cNvPr id="67" name="Oval 66"/>
+          <p:cNvSpPr/>
+          <p:nvPr/>
+        </p:nvSpPr>
+        <p:spPr>
+          <a:xfrm>
+            <a:off x="1863670" y="2095088"/>
+            <a:ext cx="101600" cy="101600"/>
+          </a:xfrm>
+          <a:prstGeom prst="ellipse">
+            <a:avLst/>
+          </a:prstGeom>
+          <a:solidFill>
+            <a:srgbClr val="FF0000"/>
+          </a:solidFill>
+          <a:ln>
+            <a:solidFill>
+              <a:srgbClr val="FF0000"/>
+            </a:solidFill>
+          </a:ln>
+        </p:spPr>
+        <p:style>
+          <a:lnRef idx="2">
+            <a:schemeClr val="accent1">
+              <a:shade val="50000"/>
+            </a:schemeClr>
+          </a:lnRef>
+          <a:fillRef idx="1">
+            <a:schemeClr val="accent1"/>
+          </a:fillRef>
+          <a:effectRef idx="0">
+            <a:schemeClr val="accent1"/>
+          </a:effectRef>
+          <a:fontRef idx="minor">
+            <a:schemeClr val="lt1"/>
+          </a:fontRef>
+        </p:style>
+        <p:txBody>
+          <a:bodyPr rtlCol="0" anchor="ctr"/>
+          <a:lstStyle/>
+          <a:p>
+            <a:pPr algn="ctr"/>
+            <a:endParaRPr lang="en-GB"/>
+          </a:p>
+        </p:txBody>
+      </p:sp>
+      <p:sp>
+        <p:nvSpPr>
+          <p:cNvPr id="68" name="Oval 67"/>
+          <p:cNvSpPr/>
+          <p:nvPr/>
+        </p:nvSpPr>
+        <p:spPr>
+          <a:xfrm>
+            <a:off x="2308170" y="2095088"/>
+            <a:ext cx="101600" cy="101600"/>
+          </a:xfrm>
+          <a:prstGeom prst="ellipse">
+            <a:avLst/>
+          </a:prstGeom>
+          <a:solidFill>
+            <a:srgbClr val="FF0000"/>
+          </a:solidFill>
+          <a:ln>
+            <a:solidFill>
+              <a:srgbClr val="FF0000"/>
+            </a:solidFill>
+          </a:ln>
+        </p:spPr>
+        <p:style>
+          <a:lnRef idx="2">
+            <a:schemeClr val="accent1">
+              <a:shade val="50000"/>
+            </a:schemeClr>
+          </a:lnRef>
+          <a:fillRef idx="1">
+            <a:schemeClr val="accent1"/>
+          </a:fillRef>
+          <a:effectRef idx="0">
+            <a:schemeClr val="accent1"/>
+          </a:effectRef>
+          <a:fontRef idx="minor">
+            <a:schemeClr val="lt1"/>
+          </a:fontRef>
+        </p:style>
+        <p:txBody>
+          <a:bodyPr rtlCol="0" anchor="ctr"/>
+          <a:lstStyle/>
+          <a:p>
+            <a:pPr algn="ctr"/>
+            <a:endParaRPr lang="en-GB"/>
+          </a:p>
+        </p:txBody>
+      </p:sp>
+      <p:sp>
+        <p:nvSpPr>
+          <p:cNvPr id="69" name="Oval 68"/>
+          <p:cNvSpPr/>
+          <p:nvPr/>
+        </p:nvSpPr>
+        <p:spPr>
+          <a:xfrm>
+            <a:off x="1876370" y="1726788"/>
+            <a:ext cx="101600" cy="101600"/>
+          </a:xfrm>
+          <a:prstGeom prst="ellipse">
+            <a:avLst/>
+          </a:prstGeom>
+          <a:solidFill>
+            <a:srgbClr val="FF0000"/>
+          </a:solidFill>
+          <a:ln w="38100">
+            <a:noFill/>
+          </a:ln>
+        </p:spPr>
+        <p:style>
+          <a:lnRef idx="2">
+            <a:schemeClr val="accent1">
+              <a:shade val="50000"/>
+            </a:schemeClr>
+          </a:lnRef>
+          <a:fillRef idx="1">
+            <a:schemeClr val="accent1"/>
+          </a:fillRef>
+          <a:effectRef idx="0">
+            <a:schemeClr val="accent1"/>
+          </a:effectRef>
+          <a:fontRef idx="minor">
+            <a:schemeClr val="lt1"/>
+          </a:fontRef>
+        </p:style>
+        <p:txBody>
+          <a:bodyPr rtlCol="0" anchor="ctr"/>
+          <a:lstStyle/>
+          <a:p>
+            <a:pPr algn="ctr"/>
+            <a:endParaRPr lang="en-GB"/>
+          </a:p>
+        </p:txBody>
+      </p:sp>
+      <p:sp>
+        <p:nvSpPr>
+          <p:cNvPr id="70" name="Oval 69"/>
+          <p:cNvSpPr/>
+          <p:nvPr/>
+        </p:nvSpPr>
+        <p:spPr>
+          <a:xfrm>
+            <a:off x="2320870" y="1726788"/>
+            <a:ext cx="101600" cy="101600"/>
+          </a:xfrm>
+          <a:prstGeom prst="ellipse">
+            <a:avLst/>
+          </a:prstGeom>
+          <a:solidFill>
+            <a:srgbClr val="FF0000"/>
+          </a:solidFill>
+          <a:ln w="38100">
+            <a:noFill/>
+          </a:ln>
+        </p:spPr>
+        <p:style>
+          <a:lnRef idx="2">
+            <a:schemeClr val="accent1">
+              <a:shade val="50000"/>
+            </a:schemeClr>
+          </a:lnRef>
+          <a:fillRef idx="1">
+            <a:schemeClr val="accent1"/>
+          </a:fillRef>
+          <a:effectRef idx="0">
+            <a:schemeClr val="accent1"/>
+          </a:effectRef>
+          <a:fontRef idx="minor">
+            <a:schemeClr val="lt1"/>
+          </a:fontRef>
+        </p:style>
+        <p:txBody>
+          <a:bodyPr rtlCol="0" anchor="ctr"/>
+          <a:lstStyle/>
+          <a:p>
+            <a:pPr algn="ctr"/>
+            <a:endParaRPr lang="en-GB"/>
+          </a:p>
+        </p:txBody>
+      </p:sp>
+      <p:sp>
+        <p:nvSpPr>
+          <p:cNvPr id="71" name="TextBox 70"/>
+          <p:cNvSpPr txBox="1"/>
+          <p:nvPr/>
+        </p:nvSpPr>
+        <p:spPr>
+          <a:xfrm>
+            <a:off x="5508570" y="1371188"/>
+            <a:ext cx="1316386" cy="369332"/>
+          </a:xfrm>
+          <a:prstGeom prst="rect">
+            <a:avLst/>
+          </a:prstGeom>
+          <a:noFill/>
+        </p:spPr>
+        <p:txBody>
+          <a:bodyPr wrap="none" rtlCol="0">
+            <a:spAutoFit/>
+          </a:bodyPr>
+          <a:lstStyle/>
+          <a:p>
+            <a:r>
+              <a:rPr lang="en-GB" dirty="0"/>
+              <a:t>FBI=</a:t>
+            </a:r>
+            <a:r>
+              <a:rPr lang="en-GB" dirty="0" err="1"/>
+              <a:t>FBInner</a:t>
+            </a:r>
+            <a:endParaRPr lang="en-GB" dirty="0"/>
+          </a:p>
+        </p:txBody>
+      </p:sp>
+      <p:sp>
+        <p:nvSpPr>
+          <p:cNvPr id="72" name="Rectangle 71"/>
+          <p:cNvSpPr/>
+          <p:nvPr/>
+        </p:nvSpPr>
+        <p:spPr>
+          <a:xfrm>
+            <a:off x="5513267" y="2596222"/>
+            <a:ext cx="2476640" cy="369332"/>
+          </a:xfrm>
+          <a:prstGeom prst="rect">
+            <a:avLst/>
+          </a:prstGeom>
+        </p:spPr>
+        <p:txBody>
+          <a:bodyPr wrap="none">
+            <a:spAutoFit/>
+          </a:bodyPr>
+          <a:lstStyle/>
+          <a:p>
+            <a:r>
+              <a:rPr lang="en-GB" dirty="0"/>
+              <a:t>FBO=</a:t>
+            </a:r>
+            <a:r>
+              <a:rPr lang="en-GB" dirty="0" err="1"/>
+              <a:t>FrontBumperOuter</a:t>
+            </a:r>
+            <a:endParaRPr lang="en-GB" dirty="0"/>
+          </a:p>
+        </p:txBody>
+      </p:sp>
+      <p:sp>
+        <p:nvSpPr>
+          <p:cNvPr id="73" name="Rectangle 72"/>
+          <p:cNvSpPr/>
+          <p:nvPr/>
+        </p:nvSpPr>
+        <p:spPr>
+          <a:xfrm>
+            <a:off x="5716471" y="1973922"/>
+            <a:ext cx="1077539" cy="369332"/>
+          </a:xfrm>
+          <a:prstGeom prst="rect">
+            <a:avLst/>
+          </a:prstGeom>
+        </p:spPr>
+        <p:txBody>
+          <a:bodyPr wrap="none">
+            <a:spAutoFit/>
+          </a:bodyPr>
+          <a:lstStyle/>
+          <a:p>
+            <a:r>
+              <a:rPr lang="en-GB" dirty="0" err="1"/>
+              <a:t>FBMiddle</a:t>
+            </a:r>
+            <a:endParaRPr lang="en-GB" dirty="0"/>
+          </a:p>
+        </p:txBody>
+      </p:sp>
+      <p:sp>
+        <p:nvSpPr>
+          <p:cNvPr id="74" name="Rectangle 73"/>
+          <p:cNvSpPr/>
+          <p:nvPr/>
+        </p:nvSpPr>
+        <p:spPr>
+          <a:xfrm>
+            <a:off x="4941767" y="1364322"/>
+            <a:ext cx="468270" cy="369332"/>
+          </a:xfrm>
+          <a:prstGeom prst="rect">
+            <a:avLst/>
+          </a:prstGeom>
+        </p:spPr>
+        <p:txBody>
+          <a:bodyPr wrap="none">
+            <a:spAutoFit/>
+          </a:bodyPr>
+          <a:lstStyle/>
+          <a:p>
+            <a:r>
+              <a:rPr lang="en-GB" dirty="0"/>
+              <a:t>FAI</a:t>
+            </a:r>
+          </a:p>
+        </p:txBody>
+      </p:sp>
+      <p:sp>
+        <p:nvSpPr>
+          <p:cNvPr id="75" name="Rectangle 74"/>
+          <p:cNvSpPr/>
+          <p:nvPr/>
+        </p:nvSpPr>
+        <p:spPr>
+          <a:xfrm>
+            <a:off x="2160467" y="1326222"/>
+            <a:ext cx="1940724" cy="369332"/>
+          </a:xfrm>
+          <a:prstGeom prst="rect">
+            <a:avLst/>
+          </a:prstGeom>
+        </p:spPr>
+        <p:txBody>
+          <a:bodyPr wrap="none">
+            <a:spAutoFit/>
+          </a:bodyPr>
+          <a:lstStyle/>
+          <a:p>
+            <a:r>
+              <a:rPr lang="en-GB" dirty="0"/>
+              <a:t>RAI=</a:t>
+            </a:r>
+            <a:r>
+              <a:rPr lang="en-GB" dirty="0" err="1"/>
+              <a:t>RearAxleInner</a:t>
+            </a:r>
+            <a:endParaRPr lang="en-GB" dirty="0"/>
+          </a:p>
+        </p:txBody>
+      </p:sp>
+      <p:sp>
+        <p:nvSpPr>
+          <p:cNvPr id="76" name="Rectangle 75"/>
+          <p:cNvSpPr/>
+          <p:nvPr/>
+        </p:nvSpPr>
+        <p:spPr>
+          <a:xfrm>
+            <a:off x="1268318" y="1961222"/>
+            <a:ext cx="631904" cy="369332"/>
+          </a:xfrm>
+          <a:prstGeom prst="rect">
+            <a:avLst/>
+          </a:prstGeom>
+        </p:spPr>
+        <p:txBody>
+          <a:bodyPr wrap="none">
+            <a:spAutoFit/>
+          </a:bodyPr>
+          <a:lstStyle/>
+          <a:p>
+            <a:r>
+              <a:rPr lang="en-GB" dirty="0"/>
+              <a:t>RBM</a:t>
+            </a:r>
+          </a:p>
+        </p:txBody>
+      </p:sp>
+      <p:sp>
+        <p:nvSpPr>
+          <p:cNvPr id="77" name="Rectangle 76"/>
+          <p:cNvSpPr/>
+          <p:nvPr/>
+        </p:nvSpPr>
+        <p:spPr>
+          <a:xfrm>
+            <a:off x="4636966" y="1952151"/>
+            <a:ext cx="607730" cy="369332"/>
+          </a:xfrm>
+          <a:prstGeom prst="rect">
+            <a:avLst/>
+          </a:prstGeom>
+        </p:spPr>
+        <p:txBody>
+          <a:bodyPr wrap="none">
+            <a:spAutoFit/>
+          </a:bodyPr>
+          <a:lstStyle/>
+          <a:p>
+            <a:r>
+              <a:rPr lang="en-GB" dirty="0"/>
+              <a:t>FAM</a:t>
+            </a:r>
+          </a:p>
+        </p:txBody>
+      </p:sp>
+      <p:sp>
+        <p:nvSpPr>
+          <p:cNvPr id="78" name="Rectangle 77"/>
+          <p:cNvSpPr/>
+          <p:nvPr/>
+        </p:nvSpPr>
+        <p:spPr>
+          <a:xfrm>
+            <a:off x="116876" y="1405344"/>
+            <a:ext cx="1299074" cy="338554"/>
+          </a:xfrm>
+          <a:prstGeom prst="rect">
+            <a:avLst/>
+          </a:prstGeom>
+        </p:spPr>
+        <p:txBody>
+          <a:bodyPr wrap="none">
+            <a:spAutoFit/>
+          </a:bodyPr>
+          <a:lstStyle/>
+          <a:p>
+            <a:r>
+              <a:rPr lang="en-GB" sz="1600" dirty="0"/>
+              <a:t>WAI=</a:t>
+            </a:r>
+            <a:r>
+              <a:rPr lang="en-GB" sz="1600" dirty="0" err="1"/>
+              <a:t>WorstAI</a:t>
+            </a:r>
+            <a:endParaRPr lang="en-GB" sz="1600" dirty="0"/>
+          </a:p>
+        </p:txBody>
+      </p:sp>
+      <p:sp>
+        <p:nvSpPr>
+          <p:cNvPr id="79" name="Rectangle 78"/>
+          <p:cNvSpPr/>
+          <p:nvPr/>
+        </p:nvSpPr>
+        <p:spPr>
+          <a:xfrm>
+            <a:off x="408882" y="1755798"/>
+            <a:ext cx="579863" cy="808892"/>
+          </a:xfrm>
+          <a:prstGeom prst="rect">
+            <a:avLst/>
+          </a:prstGeom>
+          <a:solidFill>
+            <a:schemeClr val="accent1">
+              <a:alpha val="50000"/>
+            </a:schemeClr>
+          </a:solidFill>
+          <a:ln>
+            <a:noFill/>
+          </a:ln>
+        </p:spPr>
+        <p:style>
+          <a:lnRef idx="2">
+            <a:schemeClr val="accent1">
+              <a:shade val="50000"/>
+            </a:schemeClr>
+          </a:lnRef>
+          <a:fillRef idx="1">
+            <a:schemeClr val="accent1"/>
+          </a:fillRef>
+          <a:effectRef idx="0">
+            <a:schemeClr val="accent1"/>
+          </a:effectRef>
+          <a:fontRef idx="minor">
+            <a:schemeClr val="lt1"/>
+          </a:fontRef>
+        </p:style>
+        <p:txBody>
+          <a:bodyPr rtlCol="0" anchor="ctr"/>
+          <a:lstStyle/>
+          <a:p>
+            <a:pPr algn="ctr"/>
+            <a:endParaRPr lang="en-GB"/>
+          </a:p>
+        </p:txBody>
+      </p:sp>
+      <p:sp>
+        <p:nvSpPr>
+          <p:cNvPr id="80" name="Rectangle 79"/>
+          <p:cNvSpPr/>
+          <p:nvPr/>
+        </p:nvSpPr>
+        <p:spPr>
+          <a:xfrm>
+            <a:off x="534962" y="1760565"/>
+            <a:ext cx="334108" cy="123093"/>
+          </a:xfrm>
+          <a:prstGeom prst="rect">
+            <a:avLst/>
+          </a:prstGeom>
+          <a:solidFill>
+            <a:schemeClr val="tx1"/>
+          </a:solidFill>
+        </p:spPr>
+        <p:style>
+          <a:lnRef idx="2">
+            <a:schemeClr val="accent1">
+              <a:shade val="50000"/>
+            </a:schemeClr>
+          </a:lnRef>
+          <a:fillRef idx="1">
+            <a:schemeClr val="accent1"/>
+          </a:fillRef>
+          <a:effectRef idx="0">
+            <a:schemeClr val="accent1"/>
+          </a:effectRef>
+          <a:fontRef idx="minor">
+            <a:schemeClr val="lt1"/>
+          </a:fontRef>
+        </p:style>
+        <p:txBody>
+          <a:bodyPr rtlCol="0" anchor="ctr"/>
+          <a:lstStyle/>
+          <a:p>
+            <a:pPr algn="ctr"/>
+            <a:endParaRPr lang="en-GB"/>
+          </a:p>
+        </p:txBody>
+      </p:sp>
+      <p:sp>
+        <p:nvSpPr>
+          <p:cNvPr id="81" name="Rectangle 80"/>
+          <p:cNvSpPr/>
+          <p:nvPr/>
+        </p:nvSpPr>
+        <p:spPr>
+          <a:xfrm>
+            <a:off x="534962" y="2433725"/>
+            <a:ext cx="334108" cy="123093"/>
+          </a:xfrm>
+          <a:prstGeom prst="rect">
+            <a:avLst/>
+          </a:prstGeom>
+          <a:solidFill>
+            <a:schemeClr val="tx1"/>
+          </a:solidFill>
+        </p:spPr>
+        <p:style>
+          <a:lnRef idx="2">
+            <a:schemeClr val="accent1">
+              <a:shade val="50000"/>
+            </a:schemeClr>
+          </a:lnRef>
+          <a:fillRef idx="1">
+            <a:schemeClr val="accent1"/>
+          </a:fillRef>
+          <a:effectRef idx="0">
+            <a:schemeClr val="accent1"/>
+          </a:effectRef>
+          <a:fontRef idx="minor">
+            <a:schemeClr val="lt1"/>
+          </a:fontRef>
+        </p:style>
+        <p:txBody>
+          <a:bodyPr rtlCol="0" anchor="ctr"/>
+          <a:lstStyle/>
+          <a:p>
+            <a:pPr algn="ctr"/>
+            <a:endParaRPr lang="en-GB"/>
+          </a:p>
+        </p:txBody>
+      </p:sp>
+      <p:sp>
+        <p:nvSpPr>
+          <p:cNvPr id="82" name="Oval 81"/>
+          <p:cNvSpPr/>
+          <p:nvPr/>
+        </p:nvSpPr>
+        <p:spPr>
+          <a:xfrm>
+            <a:off x="631769" y="2510471"/>
+            <a:ext cx="101600" cy="101600"/>
+          </a:xfrm>
+          <a:prstGeom prst="ellipse">
+            <a:avLst/>
+          </a:prstGeom>
+          <a:solidFill>
+            <a:srgbClr val="FF0000"/>
+          </a:solidFill>
+          <a:ln>
+            <a:solidFill>
+              <a:srgbClr val="FF0000"/>
+            </a:solidFill>
+          </a:ln>
+        </p:spPr>
+        <p:style>
+          <a:lnRef idx="2">
+            <a:schemeClr val="accent1">
+              <a:shade val="50000"/>
+            </a:schemeClr>
+          </a:lnRef>
+          <a:fillRef idx="1">
+            <a:schemeClr val="accent1"/>
+          </a:fillRef>
+          <a:effectRef idx="0">
+            <a:schemeClr val="accent1"/>
+          </a:effectRef>
+          <a:fontRef idx="minor">
+            <a:schemeClr val="lt1"/>
+          </a:fontRef>
+        </p:style>
+        <p:txBody>
+          <a:bodyPr rtlCol="0" anchor="ctr"/>
+          <a:lstStyle/>
+          <a:p>
+            <a:pPr algn="ctr"/>
+            <a:endParaRPr lang="en-GB"/>
+          </a:p>
+        </p:txBody>
+      </p:sp>
+      <p:sp>
+        <p:nvSpPr>
+          <p:cNvPr id="83" name="Oval 82"/>
+          <p:cNvSpPr/>
+          <p:nvPr/>
+        </p:nvSpPr>
+        <p:spPr>
+          <a:xfrm>
+            <a:off x="631769" y="2091371"/>
+            <a:ext cx="101600" cy="101600"/>
+          </a:xfrm>
+          <a:prstGeom prst="ellipse">
+            <a:avLst/>
+          </a:prstGeom>
+          <a:solidFill>
+            <a:srgbClr val="FF0000"/>
+          </a:solidFill>
+          <a:ln>
+            <a:solidFill>
+              <a:srgbClr val="FF0000"/>
+            </a:solidFill>
+          </a:ln>
+        </p:spPr>
+        <p:style>
+          <a:lnRef idx="2">
+            <a:schemeClr val="accent1">
+              <a:shade val="50000"/>
+            </a:schemeClr>
+          </a:lnRef>
+          <a:fillRef idx="1">
+            <a:schemeClr val="accent1"/>
+          </a:fillRef>
+          <a:effectRef idx="0">
+            <a:schemeClr val="accent1"/>
+          </a:effectRef>
+          <a:fontRef idx="minor">
+            <a:schemeClr val="lt1"/>
+          </a:fontRef>
+        </p:style>
+        <p:txBody>
+          <a:bodyPr rtlCol="0" anchor="ctr"/>
+          <a:lstStyle/>
+          <a:p>
+            <a:pPr algn="ctr"/>
+            <a:endParaRPr lang="en-GB"/>
+          </a:p>
+        </p:txBody>
+      </p:sp>
+      <p:sp>
+        <p:nvSpPr>
+          <p:cNvPr id="84" name="Oval 83"/>
+          <p:cNvSpPr/>
+          <p:nvPr/>
+        </p:nvSpPr>
+        <p:spPr>
+          <a:xfrm>
+            <a:off x="644469" y="1723071"/>
+            <a:ext cx="101600" cy="101600"/>
+          </a:xfrm>
+          <a:prstGeom prst="ellipse">
+            <a:avLst/>
+          </a:prstGeom>
+          <a:solidFill>
+            <a:srgbClr val="FF0000"/>
+          </a:solidFill>
+          <a:ln w="38100">
+            <a:noFill/>
+          </a:ln>
+        </p:spPr>
+        <p:style>
+          <a:lnRef idx="2">
+            <a:schemeClr val="accent1">
+              <a:shade val="50000"/>
+            </a:schemeClr>
+          </a:lnRef>
+          <a:fillRef idx="1">
+            <a:schemeClr val="accent1"/>
+          </a:fillRef>
+          <a:effectRef idx="0">
+            <a:schemeClr val="accent1"/>
+          </a:effectRef>
+          <a:fontRef idx="minor">
+            <a:schemeClr val="lt1"/>
+          </a:fontRef>
+        </p:style>
+        <p:txBody>
+          <a:bodyPr rtlCol="0" anchor="ctr"/>
+          <a:lstStyle/>
+          <a:p>
+            <a:pPr algn="ctr"/>
+            <a:endParaRPr lang="en-GB"/>
+          </a:p>
+        </p:txBody>
+      </p:sp>
+      <p:sp>
+        <p:nvSpPr>
+          <p:cNvPr id="85" name="Rectangle 84"/>
+          <p:cNvSpPr/>
+          <p:nvPr/>
+        </p:nvSpPr>
+        <p:spPr>
+          <a:xfrm>
+            <a:off x="4" y="1931008"/>
+            <a:ext cx="743415" cy="338554"/>
+          </a:xfrm>
+          <a:prstGeom prst="rect">
+            <a:avLst/>
+          </a:prstGeom>
+        </p:spPr>
+        <p:txBody>
+          <a:bodyPr wrap="square">
+            <a:spAutoFit/>
+          </a:bodyPr>
+          <a:lstStyle/>
+          <a:p>
+            <a:r>
+              <a:rPr lang="en-GB" sz="1600" dirty="0"/>
+              <a:t>WAM</a:t>
+            </a:r>
+          </a:p>
+        </p:txBody>
+      </p:sp>
+      <p:sp>
+        <p:nvSpPr>
+          <p:cNvPr id="86" name="Rectangle 85"/>
+          <p:cNvSpPr/>
+          <p:nvPr/>
+        </p:nvSpPr>
+        <p:spPr>
+          <a:xfrm>
+            <a:off x="140983" y="2537858"/>
+            <a:ext cx="610680" cy="338554"/>
+          </a:xfrm>
+          <a:prstGeom prst="rect">
+            <a:avLst/>
+          </a:prstGeom>
+        </p:spPr>
+        <p:txBody>
+          <a:bodyPr wrap="none">
+            <a:spAutoFit/>
+          </a:bodyPr>
+          <a:lstStyle/>
+          <a:p>
+            <a:r>
+              <a:rPr lang="en-GB" sz="1600" dirty="0"/>
+              <a:t>WAO</a:t>
+            </a:r>
+          </a:p>
+        </p:txBody>
+      </p:sp>
+      <p:sp>
+        <p:nvSpPr>
+          <p:cNvPr id="87" name="Rectangle 86"/>
+          <p:cNvSpPr/>
+          <p:nvPr/>
+        </p:nvSpPr>
+        <p:spPr>
+          <a:xfrm>
+            <a:off x="4916159" y="2613711"/>
+            <a:ext cx="560282" cy="369332"/>
+          </a:xfrm>
+          <a:prstGeom prst="rect">
+            <a:avLst/>
+          </a:prstGeom>
+        </p:spPr>
+        <p:txBody>
+          <a:bodyPr wrap="none">
+            <a:spAutoFit/>
+          </a:bodyPr>
+          <a:lstStyle/>
+          <a:p>
+            <a:r>
+              <a:rPr lang="en-GB" dirty="0"/>
+              <a:t>FAO</a:t>
+            </a:r>
+          </a:p>
+        </p:txBody>
+      </p:sp>
+      <p:sp>
+        <p:nvSpPr>
+          <p:cNvPr id="88" name="Oval 87"/>
+          <p:cNvSpPr/>
+          <p:nvPr/>
+        </p:nvSpPr>
+        <p:spPr>
+          <a:xfrm>
+            <a:off x="4141342" y="2516687"/>
+            <a:ext cx="101600" cy="101600"/>
+          </a:xfrm>
+          <a:prstGeom prst="ellipse">
+            <a:avLst/>
+          </a:prstGeom>
+          <a:solidFill>
+            <a:srgbClr val="FF0000"/>
+          </a:solidFill>
+          <a:ln>
+            <a:solidFill>
+              <a:srgbClr val="FF0000"/>
+            </a:solidFill>
+          </a:ln>
+        </p:spPr>
+        <p:style>
+          <a:lnRef idx="2">
+            <a:schemeClr val="accent1">
+              <a:shade val="50000"/>
+            </a:schemeClr>
+          </a:lnRef>
+          <a:fillRef idx="1">
+            <a:schemeClr val="accent1"/>
+          </a:fillRef>
+          <a:effectRef idx="0">
+            <a:schemeClr val="accent1"/>
+          </a:effectRef>
+          <a:fontRef idx="minor">
+            <a:schemeClr val="lt1"/>
+          </a:fontRef>
+        </p:style>
+        <p:txBody>
+          <a:bodyPr rtlCol="0" anchor="ctr"/>
+          <a:lstStyle/>
+          <a:p>
+            <a:pPr algn="ctr"/>
+            <a:endParaRPr lang="en-GB"/>
+          </a:p>
+        </p:txBody>
+      </p:sp>
+      <p:sp>
+        <p:nvSpPr>
+          <p:cNvPr id="89" name="Oval 88"/>
+          <p:cNvSpPr/>
+          <p:nvPr/>
+        </p:nvSpPr>
+        <p:spPr>
+          <a:xfrm>
+            <a:off x="4141342" y="2097587"/>
+            <a:ext cx="101600" cy="101600"/>
+          </a:xfrm>
+          <a:prstGeom prst="ellipse">
+            <a:avLst/>
+          </a:prstGeom>
+          <a:solidFill>
+            <a:srgbClr val="FF0000"/>
+          </a:solidFill>
+          <a:ln>
+            <a:solidFill>
+              <a:srgbClr val="FF0000"/>
+            </a:solidFill>
+          </a:ln>
+        </p:spPr>
+        <p:style>
+          <a:lnRef idx="2">
+            <a:schemeClr val="accent1">
+              <a:shade val="50000"/>
+            </a:schemeClr>
+          </a:lnRef>
+          <a:fillRef idx="1">
+            <a:schemeClr val="accent1"/>
+          </a:fillRef>
+          <a:effectRef idx="0">
+            <a:schemeClr val="accent1"/>
+          </a:effectRef>
+          <a:fontRef idx="minor">
+            <a:schemeClr val="lt1"/>
+          </a:fontRef>
+        </p:style>
+        <p:txBody>
+          <a:bodyPr rtlCol="0" anchor="ctr"/>
+          <a:lstStyle/>
+          <a:p>
+            <a:pPr algn="ctr"/>
+            <a:endParaRPr lang="en-GB"/>
+          </a:p>
+        </p:txBody>
+      </p:sp>
+      <p:sp>
+        <p:nvSpPr>
+          <p:cNvPr id="90" name="Oval 89"/>
+          <p:cNvSpPr/>
+          <p:nvPr/>
+        </p:nvSpPr>
+        <p:spPr>
+          <a:xfrm>
+            <a:off x="4154042" y="1729287"/>
+            <a:ext cx="101600" cy="101600"/>
+          </a:xfrm>
+          <a:prstGeom prst="ellipse">
+            <a:avLst/>
+          </a:prstGeom>
+          <a:solidFill>
+            <a:srgbClr val="FF0000"/>
+          </a:solidFill>
+          <a:ln>
+            <a:solidFill>
+              <a:srgbClr val="FF0000"/>
+            </a:solidFill>
+          </a:ln>
+        </p:spPr>
+        <p:style>
+          <a:lnRef idx="2">
+            <a:schemeClr val="accent1">
+              <a:shade val="50000"/>
+            </a:schemeClr>
+          </a:lnRef>
+          <a:fillRef idx="1">
+            <a:schemeClr val="accent1"/>
+          </a:fillRef>
+          <a:effectRef idx="0">
+            <a:schemeClr val="accent1"/>
+          </a:effectRef>
+          <a:fontRef idx="minor">
+            <a:schemeClr val="lt1"/>
+          </a:fontRef>
+        </p:style>
+        <p:txBody>
+          <a:bodyPr rtlCol="0" anchor="ctr"/>
+          <a:lstStyle/>
+          <a:p>
+            <a:pPr algn="ctr"/>
+            <a:endParaRPr lang="en-GB"/>
+          </a:p>
+        </p:txBody>
+      </p:sp>
+    </p:spTree>
+    <p:extLst>
+      <p:ext uri="{BB962C8B-B14F-4D97-AF65-F5344CB8AC3E}">
+        <p14:creationId xmlns:p14="http://schemas.microsoft.com/office/powerpoint/2010/main" val="1280119185"/>
+      </p:ext>
+    </p:extLst>
+  </p:cSld>
+  <p:clrMapOvr>
+    <a:masterClrMapping/>
+  </p:clrMapOvr>
+</p:sld>
+</file>
+
+<file path=ppt/slides/slide4.xml><?xml version="1.0" encoding="utf-8"?>
+<p:sld xmlns:a="http://schemas.openxmlformats.org/drawingml/2006/main" xmlns:r="http://schemas.openxmlformats.org/officeDocument/2006/relationships" xmlns:p="http://schemas.openxmlformats.org/presentationml/2006/main">
+  <p:cSld>
+    <p:spTree>
+      <p:nvGrpSpPr>
+        <p:cNvPr id="1" name=""/>
+        <p:cNvGrpSpPr/>
+        <p:nvPr/>
+      </p:nvGrpSpPr>
+      <p:grpSpPr>
+        <a:xfrm>
+          <a:off x="0" y="0"/>
+          <a:ext cx="0" cy="0"/>
+          <a:chOff x="0" y="0"/>
+          <a:chExt cx="0" cy="0"/>
+        </a:xfrm>
+      </p:grpSpPr>
+      <p:sp>
+        <p:nvSpPr>
+          <p:cNvPr id="30" name="Cloud 29"/>
+          <p:cNvSpPr/>
+          <p:nvPr/>
+        </p:nvSpPr>
+        <p:spPr>
+          <a:xfrm>
+            <a:off x="7359805" y="3423428"/>
+            <a:ext cx="4572000" cy="2453269"/>
+          </a:xfrm>
+          <a:prstGeom prst="cloud">
+            <a:avLst/>
+          </a:prstGeom>
+          <a:solidFill>
+            <a:schemeClr val="bg1">
+              <a:lumMod val="95000"/>
+            </a:schemeClr>
+          </a:solidFill>
+        </p:spPr>
+        <p:style>
+          <a:lnRef idx="2">
+            <a:schemeClr val="accent1">
+              <a:shade val="50000"/>
+            </a:schemeClr>
+          </a:lnRef>
+          <a:fillRef idx="1">
+            <a:schemeClr val="accent1"/>
+          </a:fillRef>
+          <a:effectRef idx="0">
+            <a:schemeClr val="accent1"/>
+          </a:effectRef>
+          <a:fontRef idx="minor">
+            <a:schemeClr val="lt1"/>
+          </a:fontRef>
+        </p:style>
+        <p:txBody>
+          <a:bodyPr rtlCol="0" anchor="ctr"/>
+          <a:lstStyle/>
+          <a:p>
+            <a:pPr algn="ctr"/>
+            <a:endParaRPr lang="en-GB"/>
+          </a:p>
+        </p:txBody>
+      </p:sp>
+      <p:sp>
+        <p:nvSpPr>
+          <p:cNvPr id="2" name="Title 1"/>
+          <p:cNvSpPr>
+            <a:spLocks noGrp="1"/>
+          </p:cNvSpPr>
+          <p:nvPr>
+            <p:ph type="title"/>
+          </p:nvPr>
+        </p:nvSpPr>
+        <p:spPr/>
+        <p:txBody>
+          <a:bodyPr>
+            <a:normAutofit/>
+          </a:bodyPr>
+          <a:lstStyle/>
+          <a:p>
             <a:r>
               <a:rPr lang="en-GB" sz="5400" dirty="0"/>
               <a:t>SA, </a:t>
@@ -8866,26 +11205,13 @@
                   <a:srgbClr val="FF0000"/>
                 </a:solidFill>
               </a:rPr>
-              <a:t>Present known open issues with this slide: </a:t>
+              <a:t>Present known open issues with this slide: ###, ###, …</a:t>
             </a:r>
-            <a:r>
-              <a:rPr lang="en-GB" i="1" dirty="0">
-                <a:solidFill>
-                  <a:srgbClr val="FF0000"/>
-                </a:solidFill>
-              </a:rPr>
-              <a:t>###, ###, …</a:t>
-            </a:r>
-            <a:endParaRPr lang="en-GB" i="1" dirty="0">
-              <a:solidFill>
-                <a:srgbClr val="FF0000"/>
-              </a:solidFill>
-            </a:endParaRPr>
           </a:p>
         </p:txBody>
       </p:sp>
-      <mc:AlternateContent xmlns:mc="http://schemas.openxmlformats.org/markup-compatibility/2006" xmlns:a14="http://schemas.microsoft.com/office/drawing/2010/main">
-        <mc:Choice Requires="a14">
+      <mc:AlternateContent xmlns:mc="http://schemas.openxmlformats.org/markup-compatibility/2006">
+        <mc:Choice xmlns:a14="http://schemas.microsoft.com/office/drawing/2010/main" Requires="a14">
           <p:sp>
             <p:nvSpPr>
               <p:cNvPr id="18" name="TextBox 17"/>
@@ -8895,7 +11221,7 @@
             <p:spPr>
               <a:xfrm>
                 <a:off x="435432" y="3037779"/>
-                <a:ext cx="8022771" cy="1499898"/>
+                <a:ext cx="8022771" cy="1776897"/>
               </a:xfrm>
               <a:prstGeom prst="rect">
                 <a:avLst/>
@@ -9039,11 +11365,7 @@
                 </a:r>
                 <a:r>
                   <a:rPr lang="sv-SE" dirty="0"/>
-                  <a:t>, </a:t>
-                </a:r>
-                <a:r>
-                  <a:rPr lang="sv-SE" dirty="0"/>
-                  <a:t>Max </a:t>
+                  <a:t>, Max </a:t>
                 </a:r>
                 <a:r>
                   <a:rPr lang="sv-SE" dirty="0" err="1"/>
@@ -9089,9 +11411,30 @@
                   <a:buChar char="•"/>
                 </a:pPr>
                 <a:r>
-                  <a:rPr lang="sv-SE" dirty="0"/>
-                  <a:t>###</a:t>
+                  <a:rPr lang="en-GB" b="1" dirty="0"/>
+                  <a:t>Friction=</a:t>
                 </a:r>
+                <a:r>
+                  <a:rPr lang="en-GB" b="1" dirty="0">
+                    <a:solidFill>
+                      <a:srgbClr val="FF0000"/>
+                    </a:solidFill>
+                  </a:rPr>
+                  <a:t>0.35 or 0.8 (</a:t>
+                </a:r>
+                <a:r>
+                  <a:rPr lang="en-US" dirty="0"/>
+                  <a:t>the road maintenance guidelines for Sweden says that the friction should be at least 0.35 for main roads and 0.25 for minor roads</a:t>
+                </a:r>
+                <a:r>
+                  <a:rPr lang="en-GB" b="1" dirty="0" smtClean="0">
+                    <a:solidFill>
+                      <a:srgbClr val="FF0000"/>
+                    </a:solidFill>
+                  </a:rPr>
+                  <a:t>)</a:t>
+                </a:r>
+                <a:endParaRPr lang="sv-SE" dirty="0"/>
               </a:p>
               <a:p>
                 <a:r>
@@ -9100,11 +11443,7 @@
                 </a:r>
                 <a:r>
                   <a:rPr lang="en-GB" dirty="0"/>
-                  <a:t>: </a:t>
-                </a:r>
-                <a:r>
-                  <a:rPr lang="en-GB" dirty="0"/>
-                  <a:t>Maximum </a:t>
+                  <a:t>: Maximum </a:t>
                 </a:r>
                 <a14:m>
                   <m:oMath xmlns:m="http://schemas.openxmlformats.org/officeDocument/2006/math">
@@ -9163,18 +11502,13 @@
                 </a:r>
                 <a:r>
                   <a:rPr lang="sv-SE" dirty="0"/>
-                  <a:t> start in</a:t>
+                  <a:t> start in.</a:t>
                 </a:r>
-                <a:r>
-                  <a:rPr lang="sv-SE" dirty="0"/>
-                  <a:t>.</a:t>
-                </a:r>
-                <a:endParaRPr lang="sv-SE" dirty="0"/>
               </a:p>
             </p:txBody>
           </p:sp>
         </mc:Choice>
-        <mc:Fallback xmlns="">
+        <mc:Fallback>
           <p:sp>
             <p:nvSpPr>
               <p:cNvPr id="18" name="TextBox 17"/>
@@ -9185,8 +11519,8 @@
             </p:nvSpPr>
             <p:spPr>
               <a:xfrm>
-                <a:off x="435428" y="3037779"/>
-                <a:ext cx="8022771" cy="1499898"/>
+                <a:off x="435432" y="3037779"/>
+                <a:ext cx="8022771" cy="1776897"/>
               </a:xfrm>
               <a:prstGeom prst="rect">
                 <a:avLst/>
@@ -9194,7 +11528,7 @@
               <a:blipFill rotWithShape="0">
                 <a:blip r:embed="rId2"/>
                 <a:stretch>
-                  <a:fillRect l="-608" t="-2033" b="-4472"/>
+                  <a:fillRect l="-607" t="-1712" b="-3425"/>
                 </a:stretch>
               </a:blipFill>
             </p:spPr>
@@ -9263,23 +11597,7 @@
                   <a:schemeClr val="tx1"/>
                 </a:solidFill>
               </a:rPr>
-              <a:t>Present </a:t>
-            </a:r>
-            <a:r>
-              <a:rPr lang="en-GB" sz="1400" dirty="0">
-                <a:solidFill>
-                  <a:schemeClr val="tx1"/>
-                </a:solidFill>
-              </a:rPr>
-              <a:t>(</a:t>
-            </a:r>
-            <a:r>
-              <a:rPr lang="en-GB" sz="1400" dirty="0">
-                <a:solidFill>
-                  <a:schemeClr val="tx1"/>
-                </a:solidFill>
-              </a:rPr>
-              <a:t>20</a:t>
+              <a:t>Present (20</a:t>
             </a:r>
             <a:r>
               <a:rPr lang="en-GB" sz="1400" dirty="0">
@@ -9295,15 +11613,7 @@
                   <a:schemeClr val="tx1"/>
                 </a:solidFill>
               </a:rPr>
-              <a:t>) </a:t>
-            </a:r>
-            <a:r>
-              <a:rPr lang="en-GB" sz="1400" dirty="0">
-                <a:solidFill>
-                  <a:schemeClr val="tx1"/>
-                </a:solidFill>
-              </a:rPr>
-              <a:t>proposal from “HCT in </a:t>
+              <a:t>) proposal from “HCT in </a:t>
             </a:r>
             <a:r>
               <a:rPr lang="en-GB" sz="1400" dirty="0" err="1">
@@ -9319,21 +11629,8 @@
                   <a:schemeClr val="tx1"/>
                 </a:solidFill>
               </a:rPr>
-              <a:t>-project</a:t>
+              <a:t>-project”</a:t>
             </a:r>
-            <a:r>
-              <a:rPr lang="en-GB" sz="1400" dirty="0">
-                <a:solidFill>
-                  <a:schemeClr val="tx1"/>
-                </a:solidFill>
-              </a:rPr>
-              <a:t>”</a:t>
-            </a:r>
-            <a:endParaRPr lang="en-GB" sz="1400" dirty="0">
-              <a:solidFill>
-                <a:schemeClr val="tx1"/>
-              </a:solidFill>
-            </a:endParaRPr>
           </a:p>
         </p:txBody>
       </p:sp>
@@ -9397,11 +11694,6 @@
               </a:rPr>
               <a:t>###</a:t>
             </a:r>
-            <a:endParaRPr lang="en-GB" sz="1400" dirty="0">
-              <a:solidFill>
-                <a:srgbClr val="FF0000"/>
-              </a:solidFill>
-            </a:endParaRPr>
           </a:p>
         </p:txBody>
       </p:sp>
@@ -9431,7 +11723,6 @@
               <a:rPr lang="en-GB" dirty="0"/>
               <a:t>Mark which manoeuvre and measure in Open PBS Tool and in project:</a:t>
             </a:r>
-            <a:endParaRPr lang="en-GB" dirty="0"/>
           </a:p>
         </p:txBody>
       </p:sp>
@@ -9964,7 +12255,7 @@
 </p:sld>
 </file>
 
-<file path=ppt/slides/slide4.xml><?xml version="1.0" encoding="utf-8"?>
+<file path=ppt/slides/slide5.xml><?xml version="1.0" encoding="utf-8"?>
 <p:sld xmlns:a="http://schemas.openxmlformats.org/drawingml/2006/main" xmlns:r="http://schemas.openxmlformats.org/officeDocument/2006/relationships" xmlns:p="http://schemas.openxmlformats.org/presentationml/2006/main">
   <p:cSld>
     <p:spTree>
@@ -10000,13 +12291,8 @@
           <a:p>
             <a:r>
               <a:rPr lang="en-GB" sz="5400" dirty="0"/>
-              <a:t>RWA, Rearward </a:t>
+              <a:t>RWA, Rearward Amplification</a:t>
             </a:r>
-            <a:r>
-              <a:rPr lang="en-GB" sz="5400" dirty="0"/>
-              <a:t>Amplification</a:t>
-            </a:r>
-            <a:endParaRPr lang="en-GB" sz="5400" dirty="0"/>
           </a:p>
         </p:txBody>
       </p:sp>
@@ -10887,7 +13173,6 @@
               <a:rPr lang="en-US" dirty="0"/>
               <a:t>/ay11</a:t>
             </a:r>
-            <a:endParaRPr lang="en-US" dirty="0"/>
           </a:p>
         </p:txBody>
       </p:sp>
@@ -11014,11 +13299,7 @@
           <a:p>
             <a:r>
               <a:rPr lang="en-US" dirty="0"/>
-              <a:t>a</a:t>
-            </a:r>
-            <a:r>
-              <a:rPr lang="en-US" dirty="0"/>
-              <a:t>y</a:t>
+              <a:t>ay</a:t>
             </a:r>
           </a:p>
           <a:p>
@@ -11273,7 +13554,6 @@
               <a:rPr lang="en-US" dirty="0"/>
               <a:t>ay11</a:t>
             </a:r>
-            <a:endParaRPr lang="en-US" dirty="0"/>
           </a:p>
         </p:txBody>
       </p:sp>
@@ -11303,7 +13583,6 @@
               <a:rPr lang="en-US" dirty="0"/>
               <a:t>ay1</a:t>
             </a:r>
-            <a:endParaRPr lang="en-US" dirty="0"/>
           </a:p>
         </p:txBody>
       </p:sp>
@@ -11331,11 +13610,7 @@
           <a:p>
             <a:r>
               <a:rPr lang="en-US" dirty="0" err="1"/>
-              <a:t>a</a:t>
-            </a:r>
-            <a:r>
-              <a:rPr lang="en-US" dirty="0" err="1"/>
-              <a:t>y_last</a:t>
+              <a:t>ay_last</a:t>
             </a:r>
             <a:endParaRPr lang="en-US" dirty="0"/>
           </a:p>
@@ -11371,13 +13646,8 @@
           <a:p>
             <a:r>
               <a:rPr lang="en-US" dirty="0"/>
-              <a:t>o</a:t>
+              <a:t>or, “worst” vs. “first”</a:t>
             </a:r>
-            <a:r>
-              <a:rPr lang="en-US" dirty="0"/>
-              <a:t>r, “worst” vs. “first”</a:t>
-            </a:r>
-            <a:endParaRPr lang="en-US" dirty="0"/>
           </a:p>
         </p:txBody>
       </p:sp>
@@ -11446,7 +13716,6 @@
               <a:rPr lang="en-US" dirty="0"/>
               <a:t>“dolly” is worst for active case?</a:t>
             </a:r>
-            <a:endParaRPr lang="en-US" dirty="0"/>
           </a:p>
         </p:txBody>
       </p:sp>
@@ -11496,7 +13765,7 @@
 </p:sld>
 </file>
 
-<file path=ppt/slides/slide5.xml><?xml version="1.0" encoding="utf-8"?>
+<file path=ppt/slides/slide6.xml><?xml version="1.0" encoding="utf-8"?>
 <p:sld xmlns:a="http://schemas.openxmlformats.org/drawingml/2006/main" xmlns:r="http://schemas.openxmlformats.org/officeDocument/2006/relationships" xmlns:p="http://schemas.openxmlformats.org/presentationml/2006/main">
   <p:cSld>
     <p:spTree>
@@ -11532,13 +13801,8 @@
           <a:p>
             <a:r>
               <a:rPr lang="en-GB" sz="5400" dirty="0"/>
-              <a:t>YD, Yaw </a:t>
+              <a:t>YD, Yaw Damping</a:t>
             </a:r>
-            <a:r>
-              <a:rPr lang="en-GB" sz="5400" dirty="0"/>
-              <a:t>Damping</a:t>
-            </a:r>
-            <a:endParaRPr lang="en-GB" sz="5400" dirty="0"/>
           </a:p>
         </p:txBody>
       </p:sp>
@@ -12435,7 +14699,6 @@
               <a:rPr lang="en-US" dirty="0"/>
               <a:t>How many YD for a vehicle: scalar or vector?</a:t>
             </a:r>
-            <a:endParaRPr lang="en-US" dirty="0"/>
           </a:p>
         </p:txBody>
       </p:sp>
@@ -12477,13 +14740,8 @@
             </a:pPr>
             <a:r>
               <a:rPr lang="en-US" dirty="0"/>
-              <a:t>a</a:t>
+              <a:t>ay11 sine input</a:t>
             </a:r>
-            <a:r>
-              <a:rPr lang="en-US" dirty="0"/>
-              <a:t>y11 sine input</a:t>
-            </a:r>
-            <a:endParaRPr lang="en-US" dirty="0"/>
           </a:p>
         </p:txBody>
       </p:sp>
@@ -12521,7 +14779,6 @@
               <a:rPr lang="en-US" dirty="0"/>
               <a:t>?</a:t>
             </a:r>
-            <a:endParaRPr lang="en-US" dirty="0"/>
           </a:p>
         </p:txBody>
       </p:sp>
@@ -12609,7 +14866,7 @@
 </p:sld>
 </file>
 
-<file path=ppt/slides/slide6.xml><?xml version="1.0" encoding="utf-8"?>
+<file path=ppt/slides/slide7.xml><?xml version="1.0" encoding="utf-8"?>
 <p:sld xmlns:a="http://schemas.openxmlformats.org/drawingml/2006/main" xmlns:r="http://schemas.openxmlformats.org/officeDocument/2006/relationships" xmlns:p="http://schemas.openxmlformats.org/presentationml/2006/main">
   <p:cSld>
     <p:spTree>
@@ -12645,11 +14902,7 @@
           <a:p>
             <a:r>
               <a:rPr lang="en-GB" sz="5400" dirty="0"/>
-              <a:t>HSTO, High </a:t>
-            </a:r>
-            <a:r>
-              <a:rPr lang="en-GB" sz="5400" dirty="0"/>
-              <a:t>Speed Transient Off Tracking</a:t>
+              <a:t>HSTO, High Speed Transient Off Tracking</a:t>
             </a:r>
           </a:p>
         </p:txBody>
@@ -14026,7 +16279,6 @@
               <a:rPr lang="en-GB" dirty="0"/>
               <a:t>FBO</a:t>
             </a:r>
-            <a:endParaRPr lang="en-GB" dirty="0"/>
           </a:p>
         </p:txBody>
       </p:sp>
@@ -14084,7 +16336,6 @@
               <a:rPr lang="en-GB" dirty="0"/>
               <a:t>FAI</a:t>
             </a:r>
-            <a:endParaRPr lang="en-GB" dirty="0"/>
           </a:p>
         </p:txBody>
       </p:sp>
@@ -14111,11 +16362,7 @@
           <a:p>
             <a:r>
               <a:rPr lang="en-GB" dirty="0"/>
-              <a:t>R</a:t>
-            </a:r>
-            <a:r>
-              <a:rPr lang="en-GB" dirty="0"/>
-              <a:t>AI=</a:t>
+              <a:t>RAI=</a:t>
             </a:r>
             <a:r>
               <a:rPr lang="en-GB" dirty="0" err="1"/>
@@ -14356,11 +16603,7 @@
                 </a14:m>
                 <a:r>
                   <a:rPr lang="en-GB" dirty="0"/>
-                  <a:t> </a:t>
-                </a:r>
-                <a:r>
-                  <a:rPr lang="en-GB" dirty="0"/>
-                  <a:t>where </a:t>
+                  <a:t> where </a:t>
                 </a:r>
                 <a14:m>
                   <m:oMath xmlns:m="http://schemas.openxmlformats.org/officeDocument/2006/math">
@@ -14415,16 +16658,7 @@
                       <a:rPr lang="sv-SE" i="1">
                         <a:latin typeface="Cambria Math" panose="02040503050406030204" pitchFamily="18" charset="0"/>
                       </a:rPr>
-                      <m:t>=</m:t>
-                    </m:r>
-                    <m:r>
-                      <a:rPr lang="sv-SE" i="1">
-                        <a:solidFill>
-                          <a:srgbClr val="FF0000"/>
-                        </a:solidFill>
-                        <a:latin typeface="Cambria Math" panose="02040503050406030204" pitchFamily="18" charset="0"/>
-                      </a:rPr>
-                      <m:t>#?</m:t>
+                      <m:t>=#?</m:t>
                     </m:r>
                   </m:oMath>
                 </a14:m>
@@ -14437,15 +16671,7 @@
                 </a:pPr>
                 <a:r>
                   <a:rPr lang="en-GB" dirty="0"/>
-                  <a:t>FAM</a:t>
-                </a:r>
-                <a:r>
-                  <a:rPr lang="en-GB" dirty="0"/>
-                  <a:t> </a:t>
-                </a:r>
-                <a:r>
-                  <a:rPr lang="en-GB" dirty="0"/>
-                  <a:t>follow single sine: </a:t>
+                  <a:t>FAM follow single sine: </a:t>
                 </a:r>
                 <a14:m>
                   <m:oMath xmlns:m="http://schemas.openxmlformats.org/officeDocument/2006/math">
@@ -14599,11 +16825,7 @@
                 </a14:m>
                 <a:r>
                   <a:rPr lang="en-GB" dirty="0"/>
-                  <a:t> </a:t>
-                </a:r>
-                <a:r>
-                  <a:rPr lang="en-GB" dirty="0"/>
-                  <a:t>where </a:t>
+                  <a:t> where </a:t>
                 </a:r>
                 <a14:m>
                   <m:oMath xmlns:m="http://schemas.openxmlformats.org/officeDocument/2006/math">
@@ -14658,11 +16880,7 @@
                 </a14:m>
                 <a:r>
                   <a:rPr lang="en-GB" dirty="0"/>
-                  <a:t> selected so that worst </a:t>
-                </a:r>
-                <a:r>
-                  <a:rPr lang="en-GB" dirty="0"/>
-                  <a:t>HSTO</a:t>
+                  <a:t> selected so that worst HSTO</a:t>
                 </a:r>
               </a:p>
               <a:p>
@@ -14672,15 +16890,7 @@
                 </a:pPr>
                 <a:r>
                   <a:rPr lang="en-GB" dirty="0"/>
-                  <a:t>FAM </a:t>
-                </a:r>
-                <a:r>
-                  <a:rPr lang="en-GB" dirty="0"/>
-                  <a:t>follow </a:t>
-                </a:r>
-                <a:r>
-                  <a:rPr lang="en-GB" dirty="0"/>
-                  <a:t>single sine: </a:t>
+                  <a:t>FAM follow single sine: </a:t>
                 </a:r>
                 <a14:m>
                   <m:oMath xmlns:m="http://schemas.openxmlformats.org/officeDocument/2006/math">
@@ -15098,15 +17308,7 @@
                 </a:r>
                 <a:r>
                   <a:rPr lang="en-GB" b="1" dirty="0"/>
-                  <a:t>Alternatives</a:t>
-                </a:r>
-                <a:r>
-                  <a:rPr lang="en-GB" b="1" dirty="0"/>
-                  <a:t>, </a:t>
-                </a:r>
-                <a:r>
-                  <a:rPr lang="en-GB" b="1" dirty="0"/>
-                  <a:t>different point pairs:</a:t>
+                  <a:t>Alternatives, different point pairs:</a:t>
                 </a:r>
               </a:p>
               <a:p>
@@ -15126,15 +17328,7 @@
                 </a:pPr>
                 <a:r>
                   <a:rPr lang="en-GB" dirty="0"/>
-                  <a:t>FAM, </a:t>
-                </a:r>
-                <a:r>
-                  <a:rPr lang="en-GB" dirty="0"/>
-                  <a:t>RBM [</a:t>
-                </a:r>
-                <a:r>
-                  <a:rPr lang="en-GB" dirty="0"/>
-                  <a:t>Present (2016-11-17) proposal from “HCT in </a:t>
+                  <a:t>FAM, RBM [Present (2016-11-17) proposal from “HCT in </a:t>
                 </a:r>
                 <a:r>
                   <a:rPr lang="en-GB" dirty="0" err="1"/>
@@ -15142,11 +17336,7 @@
                 </a:r>
                 <a:r>
                   <a:rPr lang="en-GB" dirty="0"/>
-                  <a:t>-project</a:t>
-                </a:r>
-                <a:r>
-                  <a:rPr lang="en-GB" dirty="0"/>
-                  <a:t>”]</a:t>
+                  <a:t>-project”]</a:t>
                 </a:r>
               </a:p>
               <a:p>
@@ -15156,19 +17346,7 @@
                 </a:pPr>
                 <a:r>
                   <a:rPr lang="en-GB" dirty="0"/>
-                  <a:t>FAM, </a:t>
-                </a:r>
-                <a:r>
-                  <a:rPr lang="en-GB" dirty="0"/>
-                  <a:t>WAM [</a:t>
-                </a:r>
-                <a:r>
-                  <a:rPr lang="en-GB" dirty="0"/>
-                  <a:t>ISO 14791:2000(E)</a:t>
-                </a:r>
-                <a:r>
-                  <a:rPr lang="en-GB" dirty="0"/>
-                  <a:t>]</a:t>
+                  <a:t>FAM, WAM [ISO 14791:2000(E)]</a:t>
                 </a:r>
               </a:p>
               <a:p>
@@ -15188,17 +17366,8 @@
                 </a:pPr>
                 <a:r>
                   <a:rPr lang="en-GB" dirty="0"/>
-                  <a:t>&lt;probably around 5-10 other </a:t>
+                  <a:t>&lt;probably around 5-10 other reasonable alternatives&gt;</a:t>
                 </a:r>
-                <a:r>
-                  <a:rPr lang="en-GB" dirty="0"/>
-                  <a:t>reasonable alternatives</a:t>
-                </a:r>
-                <a:r>
-                  <a:rPr lang="en-GB" dirty="0"/>
-                  <a:t>&gt;</a:t>
-                </a:r>
-                <a:endParaRPr lang="en-GB" dirty="0"/>
               </a:p>
             </p:txBody>
           </p:sp>
@@ -15300,7 +17469,6 @@
               <a:rPr lang="en-GB" dirty="0"/>
               <a:t>RBM</a:t>
             </a:r>
-            <a:endParaRPr lang="en-GB" dirty="0"/>
           </a:p>
         </p:txBody>
       </p:sp>
@@ -15363,7 +17531,6 @@
               <a:rPr lang="en-GB" dirty="0"/>
               <a:t>FAM</a:t>
             </a:r>
-            <a:endParaRPr lang="en-GB" dirty="0"/>
           </a:p>
         </p:txBody>
       </p:sp>
@@ -15703,7 +17870,6 @@
               <a:rPr lang="en-GB" sz="1600" dirty="0"/>
               <a:t>WAM</a:t>
             </a:r>
-            <a:endParaRPr lang="en-GB" sz="1600" dirty="0"/>
           </a:p>
         </p:txBody>
       </p:sp>
@@ -15767,11 +17933,7 @@
             </a:r>
             <a:r>
               <a:rPr lang="en-GB" sz="1400" dirty="0"/>
-              <a:t>“Implemented </a:t>
-            </a:r>
-            <a:r>
-              <a:rPr lang="en-GB" sz="1400" dirty="0"/>
-              <a:t>in Open PBS tool, version </a:t>
+              <a:t>“Implemented in Open PBS tool, version </a:t>
             </a:r>
             <a:r>
               <a:rPr lang="en-GB" sz="1400" dirty="0">
@@ -15781,11 +17943,6 @@
               </a:rPr>
               <a:t>###”</a:t>
             </a:r>
-            <a:endParaRPr lang="en-GB" sz="1400" dirty="0">
-              <a:solidFill>
-                <a:srgbClr val="FF0000"/>
-              </a:solidFill>
-            </a:endParaRPr>
           </a:p>
         </p:txBody>
       </p:sp>
@@ -15802,7 +17959,7 @@
 </p:sld>
 </file>
 
-<file path=ppt/slides/slide7.xml><?xml version="1.0" encoding="utf-8"?>
+<file path=ppt/slides/slide8.xml><?xml version="1.0" encoding="utf-8"?>
 <p:sld xmlns:a="http://schemas.openxmlformats.org/drawingml/2006/main" xmlns:r="http://schemas.openxmlformats.org/officeDocument/2006/relationships" xmlns:p="http://schemas.openxmlformats.org/presentationml/2006/main">
   <p:cSld>
     <p:spTree>
@@ -15839,15 +17996,7 @@
             <a:pPr fontAlgn="ctr"/>
             <a:r>
               <a:rPr lang="en-US" sz="5400" dirty="0"/>
-              <a:t>LSSP, Low </a:t>
-            </a:r>
-            <a:r>
-              <a:rPr lang="en-US" sz="5400" dirty="0"/>
-              <a:t>Speed Swept </a:t>
-            </a:r>
-            <a:r>
-              <a:rPr lang="en-US" sz="5400" dirty="0"/>
-              <a:t>Path</a:t>
+              <a:t>LSSP, Low Speed Swept Path</a:t>
             </a:r>
             <a:endParaRPr lang="sv-SE" sz="5400" dirty="0"/>
           </a:p>
@@ -15903,23 +18052,7 @@
                   <a:schemeClr val="tx1"/>
                 </a:solidFill>
               </a:rPr>
-              <a:t>Present </a:t>
-            </a:r>
-            <a:r>
-              <a:rPr lang="en-GB" sz="1400" dirty="0">
-                <a:solidFill>
-                  <a:schemeClr val="tx1"/>
-                </a:solidFill>
-              </a:rPr>
-              <a:t>(</a:t>
-            </a:r>
-            <a:r>
-              <a:rPr lang="en-GB" sz="1400" dirty="0">
-                <a:solidFill>
-                  <a:schemeClr val="tx1"/>
-                </a:solidFill>
-              </a:rPr>
-              <a:t>20</a:t>
+              <a:t>Present (20</a:t>
             </a:r>
             <a:r>
               <a:rPr lang="en-GB" sz="1400" dirty="0">
@@ -15935,15 +18068,7 @@
                   <a:schemeClr val="tx1"/>
                 </a:solidFill>
               </a:rPr>
-              <a:t>) </a:t>
-            </a:r>
-            <a:r>
-              <a:rPr lang="en-GB" sz="1400" dirty="0">
-                <a:solidFill>
-                  <a:schemeClr val="tx1"/>
-                </a:solidFill>
-              </a:rPr>
-              <a:t>proposal from “HCT in </a:t>
+              <a:t>) proposal from “HCT in </a:t>
             </a:r>
             <a:r>
               <a:rPr lang="en-GB" sz="1400" dirty="0" err="1">
@@ -15959,21 +18084,8 @@
                   <a:schemeClr val="tx1"/>
                 </a:solidFill>
               </a:rPr>
-              <a:t>-project</a:t>
+              <a:t>-project”</a:t>
             </a:r>
-            <a:r>
-              <a:rPr lang="en-GB" sz="1400" dirty="0">
-                <a:solidFill>
-                  <a:schemeClr val="tx1"/>
-                </a:solidFill>
-              </a:rPr>
-              <a:t>”</a:t>
-            </a:r>
-            <a:endParaRPr lang="en-GB" sz="1400" dirty="0">
-              <a:solidFill>
-                <a:schemeClr val="tx1"/>
-              </a:solidFill>
-            </a:endParaRPr>
           </a:p>
         </p:txBody>
       </p:sp>
@@ -16037,11 +18149,6 @@
               </a:rPr>
               <a:t>###</a:t>
             </a:r>
-            <a:endParaRPr lang="en-GB" sz="1400" dirty="0">
-              <a:solidFill>
-                <a:srgbClr val="FF0000"/>
-              </a:solidFill>
-            </a:endParaRPr>
           </a:p>
         </p:txBody>
       </p:sp>
@@ -17292,7 +19399,6 @@
               <a:rPr lang="en-GB" dirty="0"/>
               <a:t>FBO</a:t>
             </a:r>
-            <a:endParaRPr lang="en-GB" dirty="0"/>
           </a:p>
         </p:txBody>
       </p:sp>
@@ -17350,7 +19456,6 @@
               <a:rPr lang="en-GB" dirty="0"/>
               <a:t>FAI</a:t>
             </a:r>
-            <a:endParaRPr lang="en-GB" dirty="0"/>
           </a:p>
         </p:txBody>
       </p:sp>
@@ -17377,11 +19482,7 @@
           <a:p>
             <a:r>
               <a:rPr lang="en-GB" dirty="0"/>
-              <a:t>R</a:t>
-            </a:r>
-            <a:r>
-              <a:rPr lang="en-GB" dirty="0"/>
-              <a:t>AI=</a:t>
+              <a:t>RAI=</a:t>
             </a:r>
             <a:r>
               <a:rPr lang="en-GB" dirty="0" err="1"/>
@@ -17416,7 +19517,6 @@
               <a:rPr lang="en-GB" dirty="0"/>
               <a:t>RBM</a:t>
             </a:r>
-            <a:endParaRPr lang="en-GB" dirty="0"/>
           </a:p>
         </p:txBody>
       </p:sp>
@@ -17445,7 +19545,6 @@
               <a:rPr lang="en-GB" dirty="0"/>
               <a:t>FAM</a:t>
             </a:r>
-            <a:endParaRPr lang="en-GB" dirty="0"/>
           </a:p>
         </p:txBody>
       </p:sp>
@@ -17785,7 +19884,6 @@
               <a:rPr lang="en-GB" sz="1600" dirty="0"/>
               <a:t>WAM</a:t>
             </a:r>
-            <a:endParaRPr lang="en-GB" sz="1600" dirty="0"/>
           </a:p>
         </p:txBody>
       </p:sp>
@@ -18043,7 +20141,6 @@
               <a:rPr lang="en-GB" dirty="0"/>
               <a:t>follower</a:t>
             </a:r>
-            <a:endParaRPr lang="en-GB" dirty="0"/>
           </a:p>
         </p:txBody>
       </p:sp>
@@ -18072,7 +20169,6 @@
               <a:rPr lang="en-GB" dirty="0"/>
               <a:t>FAO</a:t>
             </a:r>
-            <a:endParaRPr lang="en-GB" dirty="0"/>
           </a:p>
         </p:txBody>
       </p:sp>

</xml_diff>

<commit_message>
added wquestion about converter dolly/ turntable on converter dolly
</commit_message>
<xml_diff>
--- a/OpenPBS/Resources/illustrations/DescriptionsPerPBS_ToTool.pptx
+++ b/OpenPBS/Resources/illustrations/DescriptionsPerPBS_ToTool.pptx
@@ -208,7 +208,7 @@
           <a:p>
             <a:fld id="{C4323B45-13B1-45B0-9F8E-94CB6922880E}" type="datetimeFigureOut">
               <a:rPr lang="en-GB" smtClean="0"/>
-              <a:t>06/01/2017</a:t>
+              <a:t>20/03/2017</a:t>
             </a:fld>
             <a:endParaRPr lang="en-GB"/>
           </a:p>
@@ -11310,8 +11310,8 @@
           </a:p>
         </p:txBody>
       </p:sp>
-      <mc:AlternateContent xmlns:mc="http://schemas.openxmlformats.org/markup-compatibility/2006">
-        <mc:Choice xmlns:a14="http://schemas.microsoft.com/office/drawing/2010/main" Requires="a14">
+      <mc:AlternateContent xmlns:mc="http://schemas.openxmlformats.org/markup-compatibility/2006" xmlns:a14="http://schemas.microsoft.com/office/drawing/2010/main">
+        <mc:Choice Requires="a14">
           <p:sp>
             <p:nvSpPr>
               <p:cNvPr id="18" name="TextBox 17"/>
@@ -11795,7 +11795,7 @@
             </p:txBody>
           </p:sp>
         </mc:Choice>
-        <mc:Fallback>
+        <mc:Fallback xmlns="">
           <p:sp>
             <p:nvSpPr>
               <p:cNvPr id="18" name="TextBox 17"/>
@@ -22146,6 +22146,56 @@
           </a:fontRef>
         </p:style>
       </p:cxnSp>
+      <p:sp>
+        <p:nvSpPr>
+          <p:cNvPr id="4" name="TextBox 3"/>
+          <p:cNvSpPr txBox="1"/>
+          <p:nvPr/>
+        </p:nvSpPr>
+        <p:spPr>
+          <a:xfrm>
+            <a:off x="189781" y="5917721"/>
+            <a:ext cx="6044925" cy="923330"/>
+          </a:xfrm>
+          <a:prstGeom prst="rect">
+            <a:avLst/>
+          </a:prstGeom>
+          <a:noFill/>
+        </p:spPr>
+        <p:txBody>
+          <a:bodyPr wrap="none" rtlCol="0">
+            <a:spAutoFit/>
+          </a:bodyPr>
+          <a:lstStyle/>
+          <a:p>
+            <a:r>
+              <a:rPr lang="en-GB" dirty="0" smtClean="0"/>
+              <a:t>Does “converter dolly + semi trailer” or “full trailer” influence?</a:t>
+            </a:r>
+          </a:p>
+          <a:p>
+            <a:r>
+              <a:rPr lang="en-GB" dirty="0" smtClean="0"/>
+              <a:t>Does “converter dolly with or without turn table” influence? </a:t>
+            </a:r>
+          </a:p>
+          <a:p>
+            <a:r>
+              <a:rPr lang="en-GB" dirty="0" smtClean="0"/>
+              <a:t>Can typically influence RWA and low speed </a:t>
+            </a:r>
+            <a:r>
+              <a:rPr lang="en-GB" dirty="0" err="1" smtClean="0"/>
+              <a:t>manouverability</a:t>
+            </a:r>
+            <a:r>
+              <a:rPr lang="en-GB" dirty="0" smtClean="0"/>
+              <a:t>.</a:t>
+            </a:r>
+            <a:endParaRPr lang="en-GB" dirty="0"/>
+          </a:p>
+        </p:txBody>
+      </p:sp>
     </p:spTree>
     <p:extLst>
       <p:ext uri="{BB962C8B-B14F-4D97-AF65-F5344CB8AC3E}">

</xml_diff>